<commit_message>
Add plots to pptx
</commit_message>
<xml_diff>
--- a/Slides.pptx
+++ b/Slides.pptx
@@ -5,7 +5,7 @@
     <p:sldMasterId id="2147483659" r:id="rId1"/>
   </p:sldMasterIdLst>
   <p:notesMasterIdLst>
-    <p:notesMasterId r:id="rId25"/>
+    <p:notesMasterId r:id="rId33"/>
   </p:notesMasterIdLst>
   <p:sldIdLst>
     <p:sldId id="256" r:id="rId2"/>
@@ -13,24 +13,32 @@
     <p:sldId id="258" r:id="rId4"/>
     <p:sldId id="263" r:id="rId5"/>
     <p:sldId id="272" r:id="rId6"/>
-    <p:sldId id="264" r:id="rId7"/>
-    <p:sldId id="269" r:id="rId8"/>
-    <p:sldId id="270" r:id="rId9"/>
-    <p:sldId id="276" r:id="rId10"/>
-    <p:sldId id="271" r:id="rId11"/>
-    <p:sldId id="273" r:id="rId12"/>
-    <p:sldId id="274" r:id="rId13"/>
-    <p:sldId id="280" r:id="rId14"/>
-    <p:sldId id="275" r:id="rId15"/>
-    <p:sldId id="277" r:id="rId16"/>
-    <p:sldId id="278" r:id="rId17"/>
-    <p:sldId id="279" r:id="rId18"/>
-    <p:sldId id="281" r:id="rId19"/>
-    <p:sldId id="266" r:id="rId20"/>
-    <p:sldId id="267" r:id="rId21"/>
-    <p:sldId id="265" r:id="rId22"/>
-    <p:sldId id="261" r:id="rId23"/>
-    <p:sldId id="262" r:id="rId24"/>
+    <p:sldId id="283" r:id="rId7"/>
+    <p:sldId id="264" r:id="rId8"/>
+    <p:sldId id="282" r:id="rId9"/>
+    <p:sldId id="284" r:id="rId10"/>
+    <p:sldId id="285" r:id="rId11"/>
+    <p:sldId id="286" r:id="rId12"/>
+    <p:sldId id="269" r:id="rId13"/>
+    <p:sldId id="270" r:id="rId14"/>
+    <p:sldId id="276" r:id="rId15"/>
+    <p:sldId id="271" r:id="rId16"/>
+    <p:sldId id="273" r:id="rId17"/>
+    <p:sldId id="274" r:id="rId18"/>
+    <p:sldId id="280" r:id="rId19"/>
+    <p:sldId id="275" r:id="rId20"/>
+    <p:sldId id="277" r:id="rId21"/>
+    <p:sldId id="278" r:id="rId22"/>
+    <p:sldId id="279" r:id="rId23"/>
+    <p:sldId id="281" r:id="rId24"/>
+    <p:sldId id="287" r:id="rId25"/>
+    <p:sldId id="288" r:id="rId26"/>
+    <p:sldId id="289" r:id="rId27"/>
+    <p:sldId id="266" r:id="rId28"/>
+    <p:sldId id="267" r:id="rId29"/>
+    <p:sldId id="265" r:id="rId30"/>
+    <p:sldId id="261" r:id="rId31"/>
+    <p:sldId id="262" r:id="rId32"/>
   </p:sldIdLst>
   <p:sldSz cx="9144000" cy="5143500" type="screen16x9"/>
   <p:notesSz cx="6858000" cy="9144000"/>
@@ -277,7 +285,12 @@
             <p14:sldId id="258"/>
             <p14:sldId id="263"/>
             <p14:sldId id="272"/>
+            <p14:sldId id="283"/>
             <p14:sldId id="264"/>
+            <p14:sldId id="282"/>
+            <p14:sldId id="284"/>
+            <p14:sldId id="285"/>
+            <p14:sldId id="286"/>
           </p14:sldIdLst>
         </p14:section>
         <p14:section name="1.2" id="{9E751314-B9D1-45B8-803A-20B0E7A9974D}">
@@ -302,6 +315,9 @@
             <p14:sldId id="278"/>
             <p14:sldId id="279"/>
             <p14:sldId id="281"/>
+            <p14:sldId id="287"/>
+            <p14:sldId id="288"/>
+            <p14:sldId id="289"/>
           </p14:sldIdLst>
         </p14:section>
         <p14:section name="Code demo" id="{776B67A1-757B-2B47-BA2D-77C31DDC225F}">
@@ -44333,6 +44349,782 @@
   <p:cSld>
     <p:spTree>
       <p:nvGrpSpPr>
+        <p:cNvPr id="1" name="">
+          <a:extLst>
+            <a:ext uri="{FF2B5EF4-FFF2-40B4-BE49-F238E27FC236}">
+              <a16:creationId xmlns:a16="http://schemas.microsoft.com/office/drawing/2014/main" id="{59B17A07-E38E-965E-1DD7-2D0400D9406E}"/>
+            </a:ext>
+          </a:extLst>
+        </p:cNvPr>
+        <p:cNvGrpSpPr/>
+        <p:nvPr/>
+      </p:nvGrpSpPr>
+      <p:grpSpPr>
+        <a:xfrm>
+          <a:off x="0" y="0"/>
+          <a:ext cx="0" cy="0"/>
+          <a:chOff x="0" y="0"/>
+          <a:chExt cx="0" cy="0"/>
+        </a:xfrm>
+      </p:grpSpPr>
+      <p:sp>
+        <p:nvSpPr>
+          <p:cNvPr id="2" name="Título 1">
+            <a:extLst>
+              <a:ext uri="{FF2B5EF4-FFF2-40B4-BE49-F238E27FC236}">
+                <a16:creationId xmlns:a16="http://schemas.microsoft.com/office/drawing/2014/main" id="{FDE2ACEA-5345-9396-7992-9F867262E58E}"/>
+              </a:ext>
+            </a:extLst>
+          </p:cNvPr>
+          <p:cNvSpPr>
+            <a:spLocks noGrp="1"/>
+          </p:cNvSpPr>
+          <p:nvPr>
+            <p:ph type="title"/>
+          </p:nvPr>
+        </p:nvSpPr>
+        <p:spPr/>
+        <p:txBody>
+          <a:bodyPr>
+            <a:normAutofit fontScale="90000"/>
+          </a:bodyPr>
+          <a:lstStyle/>
+          <a:p>
+            <a:r>
+              <a:rPr lang="en-US" dirty="0"/>
+              <a:t>Results and Analysis from task [1.1]</a:t>
+            </a:r>
+            <a:endParaRPr lang="pt-PT" dirty="0"/>
+          </a:p>
+        </p:txBody>
+      </p:sp>
+      <p:sp>
+        <p:nvSpPr>
+          <p:cNvPr id="3" name="Marcador de Posição do Texto 2">
+            <a:extLst>
+              <a:ext uri="{FF2B5EF4-FFF2-40B4-BE49-F238E27FC236}">
+                <a16:creationId xmlns:a16="http://schemas.microsoft.com/office/drawing/2014/main" id="{DC4E4F00-EAC3-92F9-DF56-7917EC495F02}"/>
+              </a:ext>
+            </a:extLst>
+          </p:cNvPr>
+          <p:cNvSpPr>
+            <a:spLocks noGrp="1"/>
+          </p:cNvSpPr>
+          <p:nvPr>
+            <p:ph type="body" idx="1"/>
+          </p:nvPr>
+        </p:nvSpPr>
+        <p:spPr/>
+        <p:txBody>
+          <a:bodyPr/>
+          <a:lstStyle/>
+          <a:p>
+            <a:endParaRPr lang="pt-PT" dirty="0"/>
+          </a:p>
+        </p:txBody>
+      </p:sp>
+      <p:sp>
+        <p:nvSpPr>
+          <p:cNvPr id="4" name="Slide Number Placeholder 3">
+            <a:extLst>
+              <a:ext uri="{FF2B5EF4-FFF2-40B4-BE49-F238E27FC236}">
+                <a16:creationId xmlns:a16="http://schemas.microsoft.com/office/drawing/2014/main" id="{EE29963B-10B7-7993-1DA9-B2BD6E93ACAF}"/>
+              </a:ext>
+            </a:extLst>
+          </p:cNvPr>
+          <p:cNvSpPr>
+            <a:spLocks noGrp="1"/>
+          </p:cNvSpPr>
+          <p:nvPr>
+            <p:ph type="sldNum" idx="12"/>
+          </p:nvPr>
+        </p:nvSpPr>
+        <p:spPr/>
+        <p:txBody>
+          <a:bodyPr/>
+          <a:lstStyle/>
+          <a:p>
+            <a:pPr marL="0" lvl="0" indent="0" algn="r" rtl="0">
+              <a:spcBef>
+                <a:spcPts val="0"/>
+              </a:spcBef>
+              <a:spcAft>
+                <a:spcPts val="0"/>
+              </a:spcAft>
+              <a:buNone/>
+            </a:pPr>
+            <a:fld id="{00000000-1234-1234-1234-123412341234}" type="slidenum">
+              <a:rPr lang="en" smtClean="0"/>
+              <a:t>10</a:t>
+            </a:fld>
+            <a:endParaRPr lang="en"/>
+          </a:p>
+        </p:txBody>
+      </p:sp>
+      <p:pic>
+        <p:nvPicPr>
+          <p:cNvPr id="7" name="Imagem 6" descr="Uma imagem com texto, captura de ecrã, diagrama, design&#10;&#10;Os conteúdos gerados por IA podem estar incorretos.">
+            <a:extLst>
+              <a:ext uri="{FF2B5EF4-FFF2-40B4-BE49-F238E27FC236}">
+                <a16:creationId xmlns:a16="http://schemas.microsoft.com/office/drawing/2014/main" id="{CD7063AD-D9BC-8DD6-5E19-AE5890AE7FA2}"/>
+              </a:ext>
+            </a:extLst>
+          </p:cNvPr>
+          <p:cNvPicPr>
+            <a:picLocks noChangeAspect="1"/>
+          </p:cNvPicPr>
+          <p:nvPr/>
+        </p:nvPicPr>
+        <p:blipFill>
+          <a:blip r:embed="rId2"/>
+          <a:stretch>
+            <a:fillRect/>
+          </a:stretch>
+        </p:blipFill>
+        <p:spPr>
+          <a:xfrm>
+            <a:off x="268636" y="1152475"/>
+            <a:ext cx="6693797" cy="3181145"/>
+          </a:xfrm>
+          <a:prstGeom prst="rect">
+            <a:avLst/>
+          </a:prstGeom>
+        </p:spPr>
+      </p:pic>
+    </p:spTree>
+    <p:extLst>
+      <p:ext uri="{BB962C8B-B14F-4D97-AF65-F5344CB8AC3E}">
+        <p14:creationId xmlns:p14="http://schemas.microsoft.com/office/powerpoint/2010/main" val="4006165288"/>
+      </p:ext>
+    </p:extLst>
+  </p:cSld>
+  <p:clrMapOvr>
+    <a:masterClrMapping/>
+  </p:clrMapOvr>
+</p:sld>
+</file>
+
+<file path=ppt/slides/slide11.xml><?xml version="1.0" encoding="utf-8"?>
+<p:sld xmlns:a="http://schemas.openxmlformats.org/drawingml/2006/main" xmlns:r="http://schemas.openxmlformats.org/officeDocument/2006/relationships" xmlns:p="http://schemas.openxmlformats.org/presentationml/2006/main">
+  <p:cSld>
+    <p:spTree>
+      <p:nvGrpSpPr>
+        <p:cNvPr id="1" name="">
+          <a:extLst>
+            <a:ext uri="{FF2B5EF4-FFF2-40B4-BE49-F238E27FC236}">
+              <a16:creationId xmlns:a16="http://schemas.microsoft.com/office/drawing/2014/main" id="{0C18FB9C-7CF7-6FB0-C773-88E5D7BAE76D}"/>
+            </a:ext>
+          </a:extLst>
+        </p:cNvPr>
+        <p:cNvGrpSpPr/>
+        <p:nvPr/>
+      </p:nvGrpSpPr>
+      <p:grpSpPr>
+        <a:xfrm>
+          <a:off x="0" y="0"/>
+          <a:ext cx="0" cy="0"/>
+          <a:chOff x="0" y="0"/>
+          <a:chExt cx="0" cy="0"/>
+        </a:xfrm>
+      </p:grpSpPr>
+      <p:sp>
+        <p:nvSpPr>
+          <p:cNvPr id="2" name="Título 1">
+            <a:extLst>
+              <a:ext uri="{FF2B5EF4-FFF2-40B4-BE49-F238E27FC236}">
+                <a16:creationId xmlns:a16="http://schemas.microsoft.com/office/drawing/2014/main" id="{394430FB-70E1-257A-CD41-BFE2AC185FA0}"/>
+              </a:ext>
+            </a:extLst>
+          </p:cNvPr>
+          <p:cNvSpPr>
+            <a:spLocks noGrp="1"/>
+          </p:cNvSpPr>
+          <p:nvPr>
+            <p:ph type="title"/>
+          </p:nvPr>
+        </p:nvSpPr>
+        <p:spPr/>
+        <p:txBody>
+          <a:bodyPr>
+            <a:normAutofit fontScale="90000"/>
+          </a:bodyPr>
+          <a:lstStyle/>
+          <a:p>
+            <a:r>
+              <a:rPr lang="en-US" dirty="0"/>
+              <a:t>Results and Analysis from task [1.1]</a:t>
+            </a:r>
+            <a:endParaRPr lang="pt-PT" dirty="0"/>
+          </a:p>
+        </p:txBody>
+      </p:sp>
+      <p:sp>
+        <p:nvSpPr>
+          <p:cNvPr id="3" name="Marcador de Posição do Texto 2">
+            <a:extLst>
+              <a:ext uri="{FF2B5EF4-FFF2-40B4-BE49-F238E27FC236}">
+                <a16:creationId xmlns:a16="http://schemas.microsoft.com/office/drawing/2014/main" id="{D27DF919-9964-E561-62BC-7A35B38555CC}"/>
+              </a:ext>
+            </a:extLst>
+          </p:cNvPr>
+          <p:cNvSpPr>
+            <a:spLocks noGrp="1"/>
+          </p:cNvSpPr>
+          <p:nvPr>
+            <p:ph type="body" idx="1"/>
+          </p:nvPr>
+        </p:nvSpPr>
+        <p:spPr/>
+        <p:txBody>
+          <a:bodyPr/>
+          <a:lstStyle/>
+          <a:p>
+            <a:endParaRPr lang="pt-PT" dirty="0"/>
+          </a:p>
+        </p:txBody>
+      </p:sp>
+      <p:sp>
+        <p:nvSpPr>
+          <p:cNvPr id="4" name="Slide Number Placeholder 3">
+            <a:extLst>
+              <a:ext uri="{FF2B5EF4-FFF2-40B4-BE49-F238E27FC236}">
+                <a16:creationId xmlns:a16="http://schemas.microsoft.com/office/drawing/2014/main" id="{97DC3CB3-433D-53A1-D9F8-129C73D7642E}"/>
+              </a:ext>
+            </a:extLst>
+          </p:cNvPr>
+          <p:cNvSpPr>
+            <a:spLocks noGrp="1"/>
+          </p:cNvSpPr>
+          <p:nvPr>
+            <p:ph type="sldNum" idx="12"/>
+          </p:nvPr>
+        </p:nvSpPr>
+        <p:spPr/>
+        <p:txBody>
+          <a:bodyPr/>
+          <a:lstStyle/>
+          <a:p>
+            <a:pPr marL="0" lvl="0" indent="0" algn="r" rtl="0">
+              <a:spcBef>
+                <a:spcPts val="0"/>
+              </a:spcBef>
+              <a:spcAft>
+                <a:spcPts val="0"/>
+              </a:spcAft>
+              <a:buNone/>
+            </a:pPr>
+            <a:fld id="{00000000-1234-1234-1234-123412341234}" type="slidenum">
+              <a:rPr lang="en" smtClean="0"/>
+              <a:t>11</a:t>
+            </a:fld>
+            <a:endParaRPr lang="en"/>
+          </a:p>
+        </p:txBody>
+      </p:sp>
+      <p:pic>
+        <p:nvPicPr>
+          <p:cNvPr id="7" name="Imagem 6" descr="Uma imagem com texto, diagrama, file, Paralelo&#10;&#10;Os conteúdos gerados por IA podem estar incorretos.">
+            <a:extLst>
+              <a:ext uri="{FF2B5EF4-FFF2-40B4-BE49-F238E27FC236}">
+                <a16:creationId xmlns:a16="http://schemas.microsoft.com/office/drawing/2014/main" id="{BEA1B7FE-235E-0097-9F18-BA2C3731A6D8}"/>
+              </a:ext>
+            </a:extLst>
+          </p:cNvPr>
+          <p:cNvPicPr>
+            <a:picLocks noChangeAspect="1"/>
+          </p:cNvPicPr>
+          <p:nvPr/>
+        </p:nvPicPr>
+        <p:blipFill>
+          <a:blip r:embed="rId2"/>
+          <a:stretch>
+            <a:fillRect/>
+          </a:stretch>
+        </p:blipFill>
+        <p:spPr>
+          <a:xfrm>
+            <a:off x="497680" y="1017725"/>
+            <a:ext cx="3677593" cy="3773192"/>
+          </a:xfrm>
+          <a:prstGeom prst="rect">
+            <a:avLst/>
+          </a:prstGeom>
+        </p:spPr>
+      </p:pic>
+    </p:spTree>
+    <p:extLst>
+      <p:ext uri="{BB962C8B-B14F-4D97-AF65-F5344CB8AC3E}">
+        <p14:creationId xmlns:p14="http://schemas.microsoft.com/office/powerpoint/2010/main" val="603348526"/>
+      </p:ext>
+    </p:extLst>
+  </p:cSld>
+  <p:clrMapOvr>
+    <a:masterClrMapping/>
+  </p:clrMapOvr>
+</p:sld>
+</file>
+
+<file path=ppt/slides/slide12.xml><?xml version="1.0" encoding="utf-8"?>
+<p:sld xmlns:a="http://schemas.openxmlformats.org/drawingml/2006/main" xmlns:r="http://schemas.openxmlformats.org/officeDocument/2006/relationships" xmlns:p="http://schemas.openxmlformats.org/presentationml/2006/main">
+  <p:cSld>
+    <p:spTree>
+      <p:nvGrpSpPr>
+        <p:cNvPr id="1" name="Shape 65"/>
+        <p:cNvGrpSpPr/>
+        <p:nvPr/>
+      </p:nvGrpSpPr>
+      <p:grpSpPr>
+        <a:xfrm>
+          <a:off x="0" y="0"/>
+          <a:ext cx="0" cy="0"/>
+          <a:chOff x="0" y="0"/>
+          <a:chExt cx="0" cy="0"/>
+        </a:xfrm>
+      </p:grpSpPr>
+      <p:sp>
+        <p:nvSpPr>
+          <p:cNvPr id="66" name="Google Shape;66;p15"/>
+          <p:cNvSpPr txBox="1">
+            <a:spLocks noGrp="1"/>
+          </p:cNvSpPr>
+          <p:nvPr>
+            <p:ph type="title"/>
+          </p:nvPr>
+        </p:nvSpPr>
+        <p:spPr>
+          <a:prstGeom prst="rect">
+            <a:avLst/>
+          </a:prstGeom>
+        </p:spPr>
+        <p:txBody>
+          <a:bodyPr spcFirstLastPara="1" wrap="square" lIns="91425" tIns="91425" rIns="91425" bIns="91425" anchor="t" anchorCtr="0">
+            <a:normAutofit/>
+          </a:bodyPr>
+          <a:lstStyle/>
+          <a:p>
+            <a:pPr marL="0" lvl="0" indent="0" algn="l" rtl="0">
+              <a:spcBef>
+                <a:spcPts val="0"/>
+              </a:spcBef>
+              <a:spcAft>
+                <a:spcPts val="0"/>
+              </a:spcAft>
+              <a:buNone/>
+            </a:pPr>
+            <a:r>
+              <a:rPr lang="pt-PT" dirty="0" err="1"/>
+              <a:t>Task</a:t>
+            </a:r>
+            <a:r>
+              <a:rPr lang="pt-PT" dirty="0"/>
+              <a:t> [1.2] - </a:t>
+            </a:r>
+            <a:r>
+              <a:rPr lang="pt-PT" dirty="0" err="1"/>
+              <a:t>Learn</a:t>
+            </a:r>
+            <a:r>
+              <a:rPr lang="pt-PT" dirty="0"/>
+              <a:t> </a:t>
+            </a:r>
+            <a:r>
+              <a:rPr lang="pt-PT" dirty="0" err="1"/>
+              <a:t>the</a:t>
+            </a:r>
+            <a:r>
+              <a:rPr lang="pt-PT" dirty="0"/>
+              <a:t> </a:t>
+            </a:r>
+            <a:r>
+              <a:rPr lang="pt-PT" dirty="0" err="1"/>
+              <a:t>baseline</a:t>
+            </a:r>
+            <a:r>
+              <a:rPr lang="pt-PT" dirty="0"/>
+              <a:t> </a:t>
+            </a:r>
+            <a:r>
+              <a:rPr lang="pt-PT" dirty="0" err="1"/>
+              <a:t>model</a:t>
+            </a:r>
+            <a:endParaRPr lang="pt-PT" dirty="0"/>
+          </a:p>
+        </p:txBody>
+      </p:sp>
+      <p:sp>
+        <p:nvSpPr>
+          <p:cNvPr id="2" name="Slide Number Placeholder 1">
+            <a:extLst>
+              <a:ext uri="{FF2B5EF4-FFF2-40B4-BE49-F238E27FC236}">
+                <a16:creationId xmlns:a16="http://schemas.microsoft.com/office/drawing/2014/main" id="{2F02ADCD-40A6-0FDE-3F7E-7E3EFE9B8615}"/>
+              </a:ext>
+            </a:extLst>
+          </p:cNvPr>
+          <p:cNvSpPr>
+            <a:spLocks noGrp="1"/>
+          </p:cNvSpPr>
+          <p:nvPr>
+            <p:ph type="sldNum" idx="12"/>
+          </p:nvPr>
+        </p:nvSpPr>
+        <p:spPr/>
+        <p:txBody>
+          <a:bodyPr/>
+          <a:lstStyle/>
+          <a:p>
+            <a:pPr marL="0" lvl="0" indent="0" algn="r" rtl="0">
+              <a:spcBef>
+                <a:spcPts val="0"/>
+              </a:spcBef>
+              <a:spcAft>
+                <a:spcPts val="0"/>
+              </a:spcAft>
+              <a:buNone/>
+            </a:pPr>
+            <a:fld id="{00000000-1234-1234-1234-123412341234}" type="slidenum">
+              <a:rPr lang="en" smtClean="0"/>
+              <a:t>12</a:t>
+            </a:fld>
+            <a:endParaRPr lang="en"/>
+          </a:p>
+        </p:txBody>
+      </p:sp>
+    </p:spTree>
+    <p:extLst>
+      <p:ext uri="{BB962C8B-B14F-4D97-AF65-F5344CB8AC3E}">
+        <p14:creationId xmlns:p14="http://schemas.microsoft.com/office/powerpoint/2010/main" val="774767926"/>
+      </p:ext>
+    </p:extLst>
+  </p:cSld>
+  <p:clrMapOvr>
+    <a:masterClrMapping/>
+  </p:clrMapOvr>
+</p:sld>
+</file>
+
+<file path=ppt/slides/slide13.xml><?xml version="1.0" encoding="utf-8"?>
+<p:sld xmlns:a="http://schemas.openxmlformats.org/drawingml/2006/main" xmlns:r="http://schemas.openxmlformats.org/officeDocument/2006/relationships" xmlns:p="http://schemas.openxmlformats.org/presentationml/2006/main">
+  <p:cSld>
+    <p:spTree>
+      <p:nvGrpSpPr>
+        <p:cNvPr id="1" name=""/>
+        <p:cNvGrpSpPr/>
+        <p:nvPr/>
+      </p:nvGrpSpPr>
+      <p:grpSpPr>
+        <a:xfrm>
+          <a:off x="0" y="0"/>
+          <a:ext cx="0" cy="0"/>
+          <a:chOff x="0" y="0"/>
+          <a:chExt cx="0" cy="0"/>
+        </a:xfrm>
+      </p:grpSpPr>
+      <p:sp>
+        <p:nvSpPr>
+          <p:cNvPr id="2" name="Título 1">
+            <a:extLst>
+              <a:ext uri="{FF2B5EF4-FFF2-40B4-BE49-F238E27FC236}">
+                <a16:creationId xmlns:a16="http://schemas.microsoft.com/office/drawing/2014/main" id="{435950B8-3572-2171-184D-7CB447F81866}"/>
+              </a:ext>
+            </a:extLst>
+          </p:cNvPr>
+          <p:cNvSpPr>
+            <a:spLocks noGrp="1"/>
+          </p:cNvSpPr>
+          <p:nvPr>
+            <p:ph type="title"/>
+          </p:nvPr>
+        </p:nvSpPr>
+        <p:spPr>
+          <a:xfrm>
+            <a:off x="311700" y="445025"/>
+            <a:ext cx="8520600" cy="572700"/>
+          </a:xfrm>
+        </p:spPr>
+        <p:txBody>
+          <a:bodyPr wrap="square" anchor="ctr">
+            <a:normAutofit/>
+          </a:bodyPr>
+          <a:lstStyle/>
+          <a:p>
+            <a:pPr>
+              <a:lnSpc>
+                <a:spcPct val="90000"/>
+              </a:lnSpc>
+            </a:pPr>
+            <a:r>
+              <a:rPr lang="en-US" sz="2600"/>
+              <a:t>What was done in task [1.2]</a:t>
+            </a:r>
+            <a:endParaRPr lang="pt-PT" sz="2600"/>
+          </a:p>
+        </p:txBody>
+      </p:sp>
+      <p:sp>
+        <p:nvSpPr>
+          <p:cNvPr id="4" name="Slide Number Placeholder 3">
+            <a:extLst>
+              <a:ext uri="{FF2B5EF4-FFF2-40B4-BE49-F238E27FC236}">
+                <a16:creationId xmlns:a16="http://schemas.microsoft.com/office/drawing/2014/main" id="{EF6583C8-87CC-4DDC-5CE6-18034C27EBE7}"/>
+              </a:ext>
+            </a:extLst>
+          </p:cNvPr>
+          <p:cNvSpPr>
+            <a:spLocks noGrp="1"/>
+          </p:cNvSpPr>
+          <p:nvPr>
+            <p:ph type="sldNum" idx="12"/>
+          </p:nvPr>
+        </p:nvSpPr>
+        <p:spPr>
+          <a:xfrm>
+            <a:off x="8472458" y="4663217"/>
+            <a:ext cx="548700" cy="393600"/>
+          </a:xfrm>
+        </p:spPr>
+        <p:txBody>
+          <a:bodyPr wrap="square" anchor="ctr">
+            <a:normAutofit/>
+          </a:bodyPr>
+          <a:lstStyle/>
+          <a:p>
+            <a:pPr marL="0" lvl="0" indent="0" rtl="0">
+              <a:lnSpc>
+                <a:spcPct val="90000"/>
+              </a:lnSpc>
+              <a:spcBef>
+                <a:spcPts val="0"/>
+              </a:spcBef>
+              <a:spcAft>
+                <a:spcPts val="600"/>
+              </a:spcAft>
+              <a:buNone/>
+            </a:pPr>
+            <a:fld id="{00000000-1234-1234-1234-123412341234}" type="slidenum">
+              <a:rPr lang="en" sz="900" smtClean="0"/>
+              <a:pPr marL="0" lvl="0" indent="0" rtl="0">
+                <a:lnSpc>
+                  <a:spcPct val="90000"/>
+                </a:lnSpc>
+                <a:spcBef>
+                  <a:spcPts val="0"/>
+                </a:spcBef>
+                <a:spcAft>
+                  <a:spcPts val="600"/>
+                </a:spcAft>
+                <a:buNone/>
+              </a:pPr>
+              <a:t>13</a:t>
+            </a:fld>
+            <a:endParaRPr lang="en" sz="900"/>
+          </a:p>
+        </p:txBody>
+      </p:sp>
+      <p:graphicFrame>
+        <p:nvGraphicFramePr>
+          <p:cNvPr id="9" name="Marcador de Posição do Texto 6">
+            <a:extLst>
+              <a:ext uri="{FF2B5EF4-FFF2-40B4-BE49-F238E27FC236}">
+                <a16:creationId xmlns:a16="http://schemas.microsoft.com/office/drawing/2014/main" id="{CC3716AE-7CAA-1B30-9DEA-AA12FA1F18F6}"/>
+              </a:ext>
+            </a:extLst>
+          </p:cNvPr>
+          <p:cNvGraphicFramePr/>
+          <p:nvPr>
+            <p:extLst>
+              <p:ext uri="{D42A27DB-BD31-4B8C-83A1-F6EECF244321}">
+                <p14:modId xmlns:p14="http://schemas.microsoft.com/office/powerpoint/2010/main" val="3233458579"/>
+              </p:ext>
+            </p:extLst>
+          </p:nvPr>
+        </p:nvGraphicFramePr>
+        <p:xfrm>
+          <a:off x="311700" y="1208225"/>
+          <a:ext cx="8520600" cy="3264408"/>
+        </p:xfrm>
+        <a:graphic>
+          <a:graphicData uri="http://schemas.openxmlformats.org/drawingml/2006/diagram">
+            <dgm:relIds xmlns:dgm="http://schemas.openxmlformats.org/drawingml/2006/diagram" xmlns:r="http://schemas.openxmlformats.org/officeDocument/2006/relationships" r:dm="rId2" r:lo="rId3" r:qs="rId4" r:cs="rId5"/>
+          </a:graphicData>
+        </a:graphic>
+      </p:graphicFrame>
+    </p:spTree>
+    <p:extLst>
+      <p:ext uri="{BB962C8B-B14F-4D97-AF65-F5344CB8AC3E}">
+        <p14:creationId xmlns:p14="http://schemas.microsoft.com/office/powerpoint/2010/main" val="2225735654"/>
+      </p:ext>
+    </p:extLst>
+  </p:cSld>
+  <p:clrMapOvr>
+    <a:masterClrMapping/>
+  </p:clrMapOvr>
+</p:sld>
+</file>
+
+<file path=ppt/slides/slide14.xml><?xml version="1.0" encoding="utf-8"?>
+<p:sld xmlns:a="http://schemas.openxmlformats.org/drawingml/2006/main" xmlns:r="http://schemas.openxmlformats.org/officeDocument/2006/relationships" xmlns:p="http://schemas.openxmlformats.org/presentationml/2006/main">
+  <p:cSld>
+    <p:spTree>
+      <p:nvGrpSpPr>
+        <p:cNvPr id="1" name=""/>
+        <p:cNvGrpSpPr/>
+        <p:nvPr/>
+      </p:nvGrpSpPr>
+      <p:grpSpPr>
+        <a:xfrm>
+          <a:off x="0" y="0"/>
+          <a:ext cx="0" cy="0"/>
+          <a:chOff x="0" y="0"/>
+          <a:chExt cx="0" cy="0"/>
+        </a:xfrm>
+      </p:grpSpPr>
+      <p:sp>
+        <p:nvSpPr>
+          <p:cNvPr id="2" name="Título 1">
+            <a:extLst>
+              <a:ext uri="{FF2B5EF4-FFF2-40B4-BE49-F238E27FC236}">
+                <a16:creationId xmlns:a16="http://schemas.microsoft.com/office/drawing/2014/main" id="{435950B8-3572-2171-184D-7CB447F81866}"/>
+              </a:ext>
+            </a:extLst>
+          </p:cNvPr>
+          <p:cNvSpPr>
+            <a:spLocks noGrp="1"/>
+          </p:cNvSpPr>
+          <p:nvPr>
+            <p:ph type="title"/>
+          </p:nvPr>
+        </p:nvSpPr>
+        <p:spPr>
+          <a:xfrm>
+            <a:off x="311700" y="445025"/>
+            <a:ext cx="8520600" cy="572700"/>
+          </a:xfrm>
+        </p:spPr>
+        <p:txBody>
+          <a:bodyPr wrap="square" anchor="ctr">
+            <a:normAutofit/>
+          </a:bodyPr>
+          <a:lstStyle/>
+          <a:p>
+            <a:pPr>
+              <a:lnSpc>
+                <a:spcPct val="90000"/>
+              </a:lnSpc>
+            </a:pPr>
+            <a:r>
+              <a:rPr lang="en-US" sz="2600"/>
+              <a:t>What was done in task [1.2]</a:t>
+            </a:r>
+            <a:endParaRPr lang="pt-PT" sz="2600"/>
+          </a:p>
+        </p:txBody>
+      </p:sp>
+      <p:sp>
+        <p:nvSpPr>
+          <p:cNvPr id="4" name="Slide Number Placeholder 3">
+            <a:extLst>
+              <a:ext uri="{FF2B5EF4-FFF2-40B4-BE49-F238E27FC236}">
+                <a16:creationId xmlns:a16="http://schemas.microsoft.com/office/drawing/2014/main" id="{EF6583C8-87CC-4DDC-5CE6-18034C27EBE7}"/>
+              </a:ext>
+            </a:extLst>
+          </p:cNvPr>
+          <p:cNvSpPr>
+            <a:spLocks noGrp="1"/>
+          </p:cNvSpPr>
+          <p:nvPr>
+            <p:ph type="sldNum" idx="12"/>
+          </p:nvPr>
+        </p:nvSpPr>
+        <p:spPr>
+          <a:xfrm>
+            <a:off x="8472458" y="4663217"/>
+            <a:ext cx="548700" cy="393600"/>
+          </a:xfrm>
+        </p:spPr>
+        <p:txBody>
+          <a:bodyPr wrap="square" anchor="ctr">
+            <a:normAutofit/>
+          </a:bodyPr>
+          <a:lstStyle/>
+          <a:p>
+            <a:pPr marL="0" lvl="0" indent="0" rtl="0">
+              <a:lnSpc>
+                <a:spcPct val="90000"/>
+              </a:lnSpc>
+              <a:spcBef>
+                <a:spcPts val="0"/>
+              </a:spcBef>
+              <a:spcAft>
+                <a:spcPts val="600"/>
+              </a:spcAft>
+              <a:buNone/>
+            </a:pPr>
+            <a:fld id="{00000000-1234-1234-1234-123412341234}" type="slidenum">
+              <a:rPr lang="en" sz="900" smtClean="0"/>
+              <a:pPr marL="0" lvl="0" indent="0" rtl="0">
+                <a:lnSpc>
+                  <a:spcPct val="90000"/>
+                </a:lnSpc>
+                <a:spcBef>
+                  <a:spcPts val="0"/>
+                </a:spcBef>
+                <a:spcAft>
+                  <a:spcPts val="600"/>
+                </a:spcAft>
+                <a:buNone/>
+              </a:pPr>
+              <a:t>14</a:t>
+            </a:fld>
+            <a:endParaRPr lang="en" sz="900"/>
+          </a:p>
+        </p:txBody>
+      </p:sp>
+      <p:graphicFrame>
+        <p:nvGraphicFramePr>
+          <p:cNvPr id="9" name="Marcador de Posição do Texto 6">
+            <a:extLst>
+              <a:ext uri="{FF2B5EF4-FFF2-40B4-BE49-F238E27FC236}">
+                <a16:creationId xmlns:a16="http://schemas.microsoft.com/office/drawing/2014/main" id="{5B5FDDFE-C925-F69E-4B7B-77EA7771CBB3}"/>
+              </a:ext>
+            </a:extLst>
+          </p:cNvPr>
+          <p:cNvGraphicFramePr/>
+          <p:nvPr>
+            <p:extLst>
+              <p:ext uri="{D42A27DB-BD31-4B8C-83A1-F6EECF244321}">
+                <p14:modId xmlns:p14="http://schemas.microsoft.com/office/powerpoint/2010/main" val="2096224779"/>
+              </p:ext>
+            </p:extLst>
+          </p:nvPr>
+        </p:nvGraphicFramePr>
+        <p:xfrm>
+          <a:off x="311700" y="1208225"/>
+          <a:ext cx="8520600" cy="3264408"/>
+        </p:xfrm>
+        <a:graphic>
+          <a:graphicData uri="http://schemas.openxmlformats.org/drawingml/2006/diagram">
+            <dgm:relIds xmlns:dgm="http://schemas.openxmlformats.org/drawingml/2006/diagram" xmlns:r="http://schemas.openxmlformats.org/officeDocument/2006/relationships" r:dm="rId2" r:lo="rId3" r:qs="rId4" r:cs="rId5"/>
+          </a:graphicData>
+        </a:graphic>
+      </p:graphicFrame>
+    </p:spTree>
+    <p:extLst>
+      <p:ext uri="{BB962C8B-B14F-4D97-AF65-F5344CB8AC3E}">
+        <p14:creationId xmlns:p14="http://schemas.microsoft.com/office/powerpoint/2010/main" val="1017707277"/>
+      </p:ext>
+    </p:extLst>
+  </p:cSld>
+  <p:clrMapOvr>
+    <a:masterClrMapping/>
+  </p:clrMapOvr>
+</p:sld>
+</file>
+
+<file path=ppt/slides/slide15.xml><?xml version="1.0" encoding="utf-8"?>
+<p:sld xmlns:a="http://schemas.openxmlformats.org/drawingml/2006/main" xmlns:r="http://schemas.openxmlformats.org/officeDocument/2006/relationships" xmlns:p="http://schemas.openxmlformats.org/presentationml/2006/main">
+  <p:cSld>
+    <p:spTree>
+      <p:nvGrpSpPr>
         <p:cNvPr id="1" name=""/>
         <p:cNvGrpSpPr/>
         <p:nvPr/>
@@ -44433,12 +45225,42 @@
             </a:pPr>
             <a:fld id="{00000000-1234-1234-1234-123412341234}" type="slidenum">
               <a:rPr lang="en" smtClean="0"/>
-              <a:t>10</a:t>
+              <a:t>15</a:t>
             </a:fld>
             <a:endParaRPr lang="en"/>
           </a:p>
         </p:txBody>
       </p:sp>
+      <p:pic>
+        <p:nvPicPr>
+          <p:cNvPr id="6" name="Imagem 5" descr="Uma imagem com texto, file, Gráfico, diagrama&#10;&#10;Os conteúdos gerados por IA podem estar incorretos.">
+            <a:extLst>
+              <a:ext uri="{FF2B5EF4-FFF2-40B4-BE49-F238E27FC236}">
+                <a16:creationId xmlns:a16="http://schemas.microsoft.com/office/drawing/2014/main" id="{41EE0C64-99C0-2953-49E3-C879261CFC43}"/>
+              </a:ext>
+            </a:extLst>
+          </p:cNvPr>
+          <p:cNvPicPr>
+            <a:picLocks noChangeAspect="1"/>
+          </p:cNvPicPr>
+          <p:nvPr/>
+        </p:nvPicPr>
+        <p:blipFill>
+          <a:blip r:embed="rId2"/>
+          <a:stretch>
+            <a:fillRect/>
+          </a:stretch>
+        </p:blipFill>
+        <p:spPr>
+          <a:xfrm>
+            <a:off x="645761" y="974754"/>
+            <a:ext cx="7759485" cy="2727915"/>
+          </a:xfrm>
+          <a:prstGeom prst="rect">
+            <a:avLst/>
+          </a:prstGeom>
+        </p:spPr>
+      </p:pic>
     </p:spTree>
     <p:extLst>
       <p:ext uri="{BB962C8B-B14F-4D97-AF65-F5344CB8AC3E}">
@@ -44452,7 +45274,7 @@
 </p:sld>
 </file>
 
-<file path=ppt/slides/slide11.xml><?xml version="1.0" encoding="utf-8"?>
+<file path=ppt/slides/slide16.xml><?xml version="1.0" encoding="utf-8"?>
 <p:sld xmlns:a="http://schemas.openxmlformats.org/drawingml/2006/main" xmlns:r="http://schemas.openxmlformats.org/officeDocument/2006/relationships" xmlns:p="http://schemas.openxmlformats.org/presentationml/2006/main">
   <p:cSld>
     <p:spTree>
@@ -44547,7 +45369,7 @@
             </a:pPr>
             <a:fld id="{00000000-1234-1234-1234-123412341234}" type="slidenum">
               <a:rPr lang="en" smtClean="0"/>
-              <a:t>11</a:t>
+              <a:t>16</a:t>
             </a:fld>
             <a:endParaRPr lang="en"/>
           </a:p>
@@ -44566,7 +45388,7 @@
 </p:sld>
 </file>
 
-<file path=ppt/slides/slide12.xml><?xml version="1.0" encoding="utf-8"?>
+<file path=ppt/slides/slide17.xml><?xml version="1.0" encoding="utf-8"?>
 <p:sld xmlns:a="http://schemas.openxmlformats.org/drawingml/2006/main" xmlns:r="http://schemas.openxmlformats.org/officeDocument/2006/relationships" xmlns:p="http://schemas.openxmlformats.org/presentationml/2006/main">
   <p:cSld>
     <p:spTree>
@@ -44678,7 +45500,7 @@
                 </a:spcAft>
                 <a:buNone/>
               </a:pPr>
-              <a:t>12</a:t>
+              <a:t>17</a:t>
             </a:fld>
             <a:endParaRPr lang="en" sz="900"/>
           </a:p>
@@ -44725,7 +45547,7 @@
 </p:sld>
 </file>
 
-<file path=ppt/slides/slide13.xml><?xml version="1.0" encoding="utf-8"?>
+<file path=ppt/slides/slide18.xml><?xml version="1.0" encoding="utf-8"?>
 <p:sld xmlns:a="http://schemas.openxmlformats.org/drawingml/2006/main" xmlns:r="http://schemas.openxmlformats.org/officeDocument/2006/relationships" xmlns:p="http://schemas.openxmlformats.org/presentationml/2006/main">
   <p:cSld>
     <p:spTree>
@@ -44837,7 +45659,7 @@
                 </a:spcAft>
                 <a:buNone/>
               </a:pPr>
-              <a:t>13</a:t>
+              <a:t>18</a:t>
             </a:fld>
             <a:endParaRPr lang="en" sz="900"/>
           </a:p>
@@ -44884,7 +45706,7 @@
 </p:sld>
 </file>
 
-<file path=ppt/slides/slide14.xml><?xml version="1.0" encoding="utf-8"?>
+<file path=ppt/slides/slide19.xml><?xml version="1.0" encoding="utf-8"?>
 <p:sld xmlns:a="http://schemas.openxmlformats.org/drawingml/2006/main" xmlns:r="http://schemas.openxmlformats.org/officeDocument/2006/relationships" xmlns:p="http://schemas.openxmlformats.org/presentationml/2006/main">
   <p:cSld>
     <p:spTree>
@@ -44989,7 +45811,7 @@
             </a:pPr>
             <a:fld id="{00000000-1234-1234-1234-123412341234}" type="slidenum">
               <a:rPr lang="en" smtClean="0"/>
-              <a:t>14</a:t>
+              <a:t>19</a:t>
             </a:fld>
             <a:endParaRPr lang="en"/>
           </a:p>
@@ -44999,658 +45821,6 @@
     <p:extLst>
       <p:ext uri="{BB962C8B-B14F-4D97-AF65-F5344CB8AC3E}">
         <p14:creationId xmlns:p14="http://schemas.microsoft.com/office/powerpoint/2010/main" val="4136294745"/>
-      </p:ext>
-    </p:extLst>
-  </p:cSld>
-  <p:clrMapOvr>
-    <a:masterClrMapping/>
-  </p:clrMapOvr>
-</p:sld>
-</file>
-
-<file path=ppt/slides/slide15.xml><?xml version="1.0" encoding="utf-8"?>
-<p:sld xmlns:a="http://schemas.openxmlformats.org/drawingml/2006/main" xmlns:r="http://schemas.openxmlformats.org/officeDocument/2006/relationships" xmlns:p="http://schemas.openxmlformats.org/presentationml/2006/main">
-  <p:cSld>
-    <p:spTree>
-      <p:nvGrpSpPr>
-        <p:cNvPr id="1" name="Shape 65"/>
-        <p:cNvGrpSpPr/>
-        <p:nvPr/>
-      </p:nvGrpSpPr>
-      <p:grpSpPr>
-        <a:xfrm>
-          <a:off x="0" y="0"/>
-          <a:ext cx="0" cy="0"/>
-          <a:chOff x="0" y="0"/>
-          <a:chExt cx="0" cy="0"/>
-        </a:xfrm>
-      </p:grpSpPr>
-      <p:sp>
-        <p:nvSpPr>
-          <p:cNvPr id="66" name="Google Shape;66;p15"/>
-          <p:cNvSpPr txBox="1">
-            <a:spLocks noGrp="1"/>
-          </p:cNvSpPr>
-          <p:nvPr>
-            <p:ph type="title"/>
-          </p:nvPr>
-        </p:nvSpPr>
-        <p:spPr>
-          <a:prstGeom prst="rect">
-            <a:avLst/>
-          </a:prstGeom>
-        </p:spPr>
-        <p:txBody>
-          <a:bodyPr spcFirstLastPara="1" wrap="square" lIns="91425" tIns="91425" rIns="91425" bIns="91425" anchor="t" anchorCtr="0">
-            <a:normAutofit/>
-          </a:bodyPr>
-          <a:lstStyle/>
-          <a:p>
-            <a:pPr marL="0" lvl="0" indent="0" algn="l" rtl="0">
-              <a:spcBef>
-                <a:spcPts val="0"/>
-              </a:spcBef>
-              <a:spcAft>
-                <a:spcPts val="0"/>
-              </a:spcAft>
-              <a:buNone/>
-            </a:pPr>
-            <a:r>
-              <a:rPr lang="pt-PT" dirty="0" err="1"/>
-              <a:t>Task</a:t>
-            </a:r>
-            <a:r>
-              <a:rPr lang="pt-PT" dirty="0"/>
-              <a:t> [2.2] - </a:t>
-            </a:r>
-            <a:r>
-              <a:rPr lang="pt-PT" dirty="0" err="1"/>
-              <a:t>Evaluiation</a:t>
-            </a:r>
-            <a:endParaRPr lang="pt-PT" dirty="0"/>
-          </a:p>
-        </p:txBody>
-      </p:sp>
-      <p:sp>
-        <p:nvSpPr>
-          <p:cNvPr id="2" name="Slide Number Placeholder 1">
-            <a:extLst>
-              <a:ext uri="{FF2B5EF4-FFF2-40B4-BE49-F238E27FC236}">
-                <a16:creationId xmlns:a16="http://schemas.microsoft.com/office/drawing/2014/main" id="{2F02ADCD-40A6-0FDE-3F7E-7E3EFE9B8615}"/>
-              </a:ext>
-            </a:extLst>
-          </p:cNvPr>
-          <p:cNvSpPr>
-            <a:spLocks noGrp="1"/>
-          </p:cNvSpPr>
-          <p:nvPr>
-            <p:ph type="sldNum" idx="12"/>
-          </p:nvPr>
-        </p:nvSpPr>
-        <p:spPr/>
-        <p:txBody>
-          <a:bodyPr/>
-          <a:lstStyle/>
-          <a:p>
-            <a:pPr marL="0" lvl="0" indent="0" algn="r" rtl="0">
-              <a:spcBef>
-                <a:spcPts val="0"/>
-              </a:spcBef>
-              <a:spcAft>
-                <a:spcPts val="0"/>
-              </a:spcAft>
-              <a:buNone/>
-            </a:pPr>
-            <a:fld id="{00000000-1234-1234-1234-123412341234}" type="slidenum">
-              <a:rPr lang="en" smtClean="0"/>
-              <a:t>15</a:t>
-            </a:fld>
-            <a:endParaRPr lang="en"/>
-          </a:p>
-        </p:txBody>
-      </p:sp>
-    </p:spTree>
-    <p:extLst>
-      <p:ext uri="{BB962C8B-B14F-4D97-AF65-F5344CB8AC3E}">
-        <p14:creationId xmlns:p14="http://schemas.microsoft.com/office/powerpoint/2010/main" val="359010921"/>
-      </p:ext>
-    </p:extLst>
-  </p:cSld>
-  <p:clrMapOvr>
-    <a:masterClrMapping/>
-  </p:clrMapOvr>
-</p:sld>
-</file>
-
-<file path=ppt/slides/slide16.xml><?xml version="1.0" encoding="utf-8"?>
-<p:sld xmlns:a="http://schemas.openxmlformats.org/drawingml/2006/main" xmlns:r="http://schemas.openxmlformats.org/officeDocument/2006/relationships" xmlns:p="http://schemas.openxmlformats.org/presentationml/2006/main">
-  <p:cSld>
-    <p:spTree>
-      <p:nvGrpSpPr>
-        <p:cNvPr id="1" name=""/>
-        <p:cNvGrpSpPr/>
-        <p:nvPr/>
-      </p:nvGrpSpPr>
-      <p:grpSpPr>
-        <a:xfrm>
-          <a:off x="0" y="0"/>
-          <a:ext cx="0" cy="0"/>
-          <a:chOff x="0" y="0"/>
-          <a:chExt cx="0" cy="0"/>
-        </a:xfrm>
-      </p:grpSpPr>
-      <p:sp>
-        <p:nvSpPr>
-          <p:cNvPr id="2" name="Título 1">
-            <a:extLst>
-              <a:ext uri="{FF2B5EF4-FFF2-40B4-BE49-F238E27FC236}">
-                <a16:creationId xmlns:a16="http://schemas.microsoft.com/office/drawing/2014/main" id="{435950B8-3572-2171-184D-7CB447F81866}"/>
-              </a:ext>
-            </a:extLst>
-          </p:cNvPr>
-          <p:cNvSpPr>
-            <a:spLocks noGrp="1"/>
-          </p:cNvSpPr>
-          <p:nvPr>
-            <p:ph type="title"/>
-          </p:nvPr>
-        </p:nvSpPr>
-        <p:spPr>
-          <a:xfrm>
-            <a:off x="311700" y="445025"/>
-            <a:ext cx="8520600" cy="572700"/>
-          </a:xfrm>
-        </p:spPr>
-        <p:txBody>
-          <a:bodyPr wrap="square" anchor="ctr">
-            <a:normAutofit/>
-          </a:bodyPr>
-          <a:lstStyle/>
-          <a:p>
-            <a:pPr>
-              <a:lnSpc>
-                <a:spcPct val="90000"/>
-              </a:lnSpc>
-            </a:pPr>
-            <a:r>
-              <a:rPr lang="en-US" sz="2600" dirty="0"/>
-              <a:t>What was done in task [2.2]</a:t>
-            </a:r>
-            <a:endParaRPr lang="pt-PT" sz="2600" dirty="0"/>
-          </a:p>
-        </p:txBody>
-      </p:sp>
-      <p:sp>
-        <p:nvSpPr>
-          <p:cNvPr id="4" name="Slide Number Placeholder 3">
-            <a:extLst>
-              <a:ext uri="{FF2B5EF4-FFF2-40B4-BE49-F238E27FC236}">
-                <a16:creationId xmlns:a16="http://schemas.microsoft.com/office/drawing/2014/main" id="{EF6583C8-87CC-4DDC-5CE6-18034C27EBE7}"/>
-              </a:ext>
-            </a:extLst>
-          </p:cNvPr>
-          <p:cNvSpPr>
-            <a:spLocks noGrp="1"/>
-          </p:cNvSpPr>
-          <p:nvPr>
-            <p:ph type="sldNum" idx="12"/>
-          </p:nvPr>
-        </p:nvSpPr>
-        <p:spPr>
-          <a:xfrm>
-            <a:off x="8472458" y="4663217"/>
-            <a:ext cx="548700" cy="393600"/>
-          </a:xfrm>
-        </p:spPr>
-        <p:txBody>
-          <a:bodyPr wrap="square" anchor="ctr">
-            <a:normAutofit/>
-          </a:bodyPr>
-          <a:lstStyle/>
-          <a:p>
-            <a:pPr marL="0" lvl="0" indent="0" rtl="0">
-              <a:lnSpc>
-                <a:spcPct val="90000"/>
-              </a:lnSpc>
-              <a:spcBef>
-                <a:spcPts val="0"/>
-              </a:spcBef>
-              <a:spcAft>
-                <a:spcPts val="600"/>
-              </a:spcAft>
-              <a:buNone/>
-            </a:pPr>
-            <a:fld id="{00000000-1234-1234-1234-123412341234}" type="slidenum">
-              <a:rPr lang="en" sz="900" smtClean="0"/>
-              <a:pPr marL="0" lvl="0" indent="0" rtl="0">
-                <a:lnSpc>
-                  <a:spcPct val="90000"/>
-                </a:lnSpc>
-                <a:spcBef>
-                  <a:spcPts val="0"/>
-                </a:spcBef>
-                <a:spcAft>
-                  <a:spcPts val="600"/>
-                </a:spcAft>
-                <a:buNone/>
-              </a:pPr>
-              <a:t>16</a:t>
-            </a:fld>
-            <a:endParaRPr lang="en" sz="900"/>
-          </a:p>
-        </p:txBody>
-      </p:sp>
-      <p:graphicFrame>
-        <p:nvGraphicFramePr>
-          <p:cNvPr id="9" name="Marcador de Posição do Texto 6">
-            <a:extLst>
-              <a:ext uri="{FF2B5EF4-FFF2-40B4-BE49-F238E27FC236}">
-                <a16:creationId xmlns:a16="http://schemas.microsoft.com/office/drawing/2014/main" id="{E2B6C4B8-F8C0-E9B5-3A6C-7B2C6AE4899D}"/>
-              </a:ext>
-            </a:extLst>
-          </p:cNvPr>
-          <p:cNvGraphicFramePr/>
-          <p:nvPr>
-            <p:extLst>
-              <p:ext uri="{D42A27DB-BD31-4B8C-83A1-F6EECF244321}">
-                <p14:modId xmlns:p14="http://schemas.microsoft.com/office/powerpoint/2010/main" val="1237431737"/>
-              </p:ext>
-            </p:extLst>
-          </p:nvPr>
-        </p:nvGraphicFramePr>
-        <p:xfrm>
-          <a:off x="311700" y="1208225"/>
-          <a:ext cx="8520600" cy="3264408"/>
-        </p:xfrm>
-        <a:graphic>
-          <a:graphicData uri="http://schemas.openxmlformats.org/drawingml/2006/diagram">
-            <dgm:relIds xmlns:dgm="http://schemas.openxmlformats.org/drawingml/2006/diagram" xmlns:r="http://schemas.openxmlformats.org/officeDocument/2006/relationships" r:dm="rId2" r:lo="rId3" r:qs="rId4" r:cs="rId5"/>
-          </a:graphicData>
-        </a:graphic>
-      </p:graphicFrame>
-    </p:spTree>
-    <p:extLst>
-      <p:ext uri="{BB962C8B-B14F-4D97-AF65-F5344CB8AC3E}">
-        <p14:creationId xmlns:p14="http://schemas.microsoft.com/office/powerpoint/2010/main" val="568520892"/>
-      </p:ext>
-    </p:extLst>
-  </p:cSld>
-  <p:clrMapOvr>
-    <a:masterClrMapping/>
-  </p:clrMapOvr>
-</p:sld>
-</file>
-
-<file path=ppt/slides/slide17.xml><?xml version="1.0" encoding="utf-8"?>
-<p:sld xmlns:a="http://schemas.openxmlformats.org/drawingml/2006/main" xmlns:r="http://schemas.openxmlformats.org/officeDocument/2006/relationships" xmlns:p="http://schemas.openxmlformats.org/presentationml/2006/main">
-  <p:cSld>
-    <p:spTree>
-      <p:nvGrpSpPr>
-        <p:cNvPr id="1" name=""/>
-        <p:cNvGrpSpPr/>
-        <p:nvPr/>
-      </p:nvGrpSpPr>
-      <p:grpSpPr>
-        <a:xfrm>
-          <a:off x="0" y="0"/>
-          <a:ext cx="0" cy="0"/>
-          <a:chOff x="0" y="0"/>
-          <a:chExt cx="0" cy="0"/>
-        </a:xfrm>
-      </p:grpSpPr>
-      <p:sp>
-        <p:nvSpPr>
-          <p:cNvPr id="2" name="Título 1">
-            <a:extLst>
-              <a:ext uri="{FF2B5EF4-FFF2-40B4-BE49-F238E27FC236}">
-                <a16:creationId xmlns:a16="http://schemas.microsoft.com/office/drawing/2014/main" id="{18C61B6A-344B-35E3-3F42-0EB9D63698C5}"/>
-              </a:ext>
-            </a:extLst>
-          </p:cNvPr>
-          <p:cNvSpPr>
-            <a:spLocks noGrp="1"/>
-          </p:cNvSpPr>
-          <p:nvPr>
-            <p:ph type="title"/>
-          </p:nvPr>
-        </p:nvSpPr>
-        <p:spPr>
-          <a:xfrm>
-            <a:off x="311700" y="445025"/>
-            <a:ext cx="8520600" cy="572700"/>
-          </a:xfrm>
-        </p:spPr>
-        <p:txBody>
-          <a:bodyPr wrap="square" anchor="ctr">
-            <a:normAutofit/>
-          </a:bodyPr>
-          <a:lstStyle/>
-          <a:p>
-            <a:pPr>
-              <a:lnSpc>
-                <a:spcPct val="90000"/>
-              </a:lnSpc>
-            </a:pPr>
-            <a:r>
-              <a:rPr lang="en-US" sz="2600" dirty="0"/>
-              <a:t>What was done in task [2.2]</a:t>
-            </a:r>
-            <a:endParaRPr lang="pt-PT" sz="2600" dirty="0"/>
-          </a:p>
-        </p:txBody>
-      </p:sp>
-      <p:sp>
-        <p:nvSpPr>
-          <p:cNvPr id="4" name="Slide Number Placeholder 3">
-            <a:extLst>
-              <a:ext uri="{FF2B5EF4-FFF2-40B4-BE49-F238E27FC236}">
-                <a16:creationId xmlns:a16="http://schemas.microsoft.com/office/drawing/2014/main" id="{11770F1A-57B0-9DBE-C4C9-21E2A31A698E}"/>
-              </a:ext>
-            </a:extLst>
-          </p:cNvPr>
-          <p:cNvSpPr>
-            <a:spLocks noGrp="1"/>
-          </p:cNvSpPr>
-          <p:nvPr>
-            <p:ph type="sldNum" idx="12"/>
-          </p:nvPr>
-        </p:nvSpPr>
-        <p:spPr>
-          <a:xfrm>
-            <a:off x="8472458" y="4663217"/>
-            <a:ext cx="548700" cy="393600"/>
-          </a:xfrm>
-        </p:spPr>
-        <p:txBody>
-          <a:bodyPr wrap="square" anchor="ctr">
-            <a:normAutofit/>
-          </a:bodyPr>
-          <a:lstStyle/>
-          <a:p>
-            <a:pPr marL="0" lvl="0" indent="0" rtl="0">
-              <a:lnSpc>
-                <a:spcPct val="90000"/>
-              </a:lnSpc>
-              <a:spcBef>
-                <a:spcPts val="0"/>
-              </a:spcBef>
-              <a:spcAft>
-                <a:spcPts val="600"/>
-              </a:spcAft>
-              <a:buNone/>
-            </a:pPr>
-            <a:fld id="{00000000-1234-1234-1234-123412341234}" type="slidenum">
-              <a:rPr lang="en" sz="900" smtClean="0"/>
-              <a:pPr marL="0" lvl="0" indent="0" rtl="0">
-                <a:lnSpc>
-                  <a:spcPct val="90000"/>
-                </a:lnSpc>
-                <a:spcBef>
-                  <a:spcPts val="0"/>
-                </a:spcBef>
-                <a:spcAft>
-                  <a:spcPts val="600"/>
-                </a:spcAft>
-                <a:buNone/>
-              </a:pPr>
-              <a:t>17</a:t>
-            </a:fld>
-            <a:endParaRPr lang="en" sz="900"/>
-          </a:p>
-        </p:txBody>
-      </p:sp>
-      <p:graphicFrame>
-        <p:nvGraphicFramePr>
-          <p:cNvPr id="6" name="Marcador de Posição do Texto 2">
-            <a:extLst>
-              <a:ext uri="{FF2B5EF4-FFF2-40B4-BE49-F238E27FC236}">
-                <a16:creationId xmlns:a16="http://schemas.microsoft.com/office/drawing/2014/main" id="{174D7F8E-0400-296E-1442-1558F0A4E179}"/>
-              </a:ext>
-            </a:extLst>
-          </p:cNvPr>
-          <p:cNvGraphicFramePr/>
-          <p:nvPr>
-            <p:extLst>
-              <p:ext uri="{D42A27DB-BD31-4B8C-83A1-F6EECF244321}">
-                <p14:modId xmlns:p14="http://schemas.microsoft.com/office/powerpoint/2010/main" val="1107985695"/>
-              </p:ext>
-            </p:extLst>
-          </p:nvPr>
-        </p:nvGraphicFramePr>
-        <p:xfrm>
-          <a:off x="311700" y="1208225"/>
-          <a:ext cx="8520600" cy="3264408"/>
-        </p:xfrm>
-        <a:graphic>
-          <a:graphicData uri="http://schemas.openxmlformats.org/drawingml/2006/diagram">
-            <dgm:relIds xmlns:dgm="http://schemas.openxmlformats.org/drawingml/2006/diagram" xmlns:r="http://schemas.openxmlformats.org/officeDocument/2006/relationships" r:dm="rId2" r:lo="rId3" r:qs="rId4" r:cs="rId5"/>
-          </a:graphicData>
-        </a:graphic>
-      </p:graphicFrame>
-    </p:spTree>
-    <p:extLst>
-      <p:ext uri="{BB962C8B-B14F-4D97-AF65-F5344CB8AC3E}">
-        <p14:creationId xmlns:p14="http://schemas.microsoft.com/office/powerpoint/2010/main" val="3985955342"/>
-      </p:ext>
-    </p:extLst>
-  </p:cSld>
-  <p:clrMapOvr>
-    <a:masterClrMapping/>
-  </p:clrMapOvr>
-</p:sld>
-</file>
-
-<file path=ppt/slides/slide18.xml><?xml version="1.0" encoding="utf-8"?>
-<p:sld xmlns:a="http://schemas.openxmlformats.org/drawingml/2006/main" xmlns:r="http://schemas.openxmlformats.org/officeDocument/2006/relationships" xmlns:p="http://schemas.openxmlformats.org/presentationml/2006/main">
-  <p:cSld>
-    <p:spTree>
-      <p:nvGrpSpPr>
-        <p:cNvPr id="1" name=""/>
-        <p:cNvGrpSpPr/>
-        <p:nvPr/>
-      </p:nvGrpSpPr>
-      <p:grpSpPr>
-        <a:xfrm>
-          <a:off x="0" y="0"/>
-          <a:ext cx="0" cy="0"/>
-          <a:chOff x="0" y="0"/>
-          <a:chExt cx="0" cy="0"/>
-        </a:xfrm>
-      </p:grpSpPr>
-      <p:sp>
-        <p:nvSpPr>
-          <p:cNvPr id="2" name="Título 1">
-            <a:extLst>
-              <a:ext uri="{FF2B5EF4-FFF2-40B4-BE49-F238E27FC236}">
-                <a16:creationId xmlns:a16="http://schemas.microsoft.com/office/drawing/2014/main" id="{18C61B6A-344B-35E3-3F42-0EB9D63698C5}"/>
-              </a:ext>
-            </a:extLst>
-          </p:cNvPr>
-          <p:cNvSpPr>
-            <a:spLocks noGrp="1"/>
-          </p:cNvSpPr>
-          <p:nvPr>
-            <p:ph type="title"/>
-          </p:nvPr>
-        </p:nvSpPr>
-        <p:spPr/>
-        <p:txBody>
-          <a:bodyPr>
-            <a:normAutofit fontScale="90000"/>
-          </a:bodyPr>
-          <a:lstStyle/>
-          <a:p>
-            <a:r>
-              <a:rPr lang="en-US" dirty="0"/>
-              <a:t>Results and Analysis from task [2.2]</a:t>
-            </a:r>
-            <a:endParaRPr lang="pt-PT" dirty="0"/>
-          </a:p>
-        </p:txBody>
-      </p:sp>
-      <p:sp>
-        <p:nvSpPr>
-          <p:cNvPr id="3" name="Marcador de Posição do Texto 2">
-            <a:extLst>
-              <a:ext uri="{FF2B5EF4-FFF2-40B4-BE49-F238E27FC236}">
-                <a16:creationId xmlns:a16="http://schemas.microsoft.com/office/drawing/2014/main" id="{A5BD8CCC-C62C-448E-5E03-7432197F63FB}"/>
-              </a:ext>
-            </a:extLst>
-          </p:cNvPr>
-          <p:cNvSpPr>
-            <a:spLocks noGrp="1"/>
-          </p:cNvSpPr>
-          <p:nvPr>
-            <p:ph type="body" idx="1"/>
-          </p:nvPr>
-        </p:nvSpPr>
-        <p:spPr/>
-        <p:txBody>
-          <a:bodyPr/>
-          <a:lstStyle/>
-          <a:p>
-            <a:endParaRPr lang="pt-PT" dirty="0"/>
-          </a:p>
-        </p:txBody>
-      </p:sp>
-      <p:sp>
-        <p:nvSpPr>
-          <p:cNvPr id="4" name="Slide Number Placeholder 3">
-            <a:extLst>
-              <a:ext uri="{FF2B5EF4-FFF2-40B4-BE49-F238E27FC236}">
-                <a16:creationId xmlns:a16="http://schemas.microsoft.com/office/drawing/2014/main" id="{11770F1A-57B0-9DBE-C4C9-21E2A31A698E}"/>
-              </a:ext>
-            </a:extLst>
-          </p:cNvPr>
-          <p:cNvSpPr>
-            <a:spLocks noGrp="1"/>
-          </p:cNvSpPr>
-          <p:nvPr>
-            <p:ph type="sldNum" idx="12"/>
-          </p:nvPr>
-        </p:nvSpPr>
-        <p:spPr/>
-        <p:txBody>
-          <a:bodyPr/>
-          <a:lstStyle/>
-          <a:p>
-            <a:pPr marL="0" lvl="0" indent="0" algn="r" rtl="0">
-              <a:spcBef>
-                <a:spcPts val="0"/>
-              </a:spcBef>
-              <a:spcAft>
-                <a:spcPts val="0"/>
-              </a:spcAft>
-              <a:buNone/>
-            </a:pPr>
-            <a:fld id="{00000000-1234-1234-1234-123412341234}" type="slidenum">
-              <a:rPr lang="en" smtClean="0"/>
-              <a:t>18</a:t>
-            </a:fld>
-            <a:endParaRPr lang="en"/>
-          </a:p>
-        </p:txBody>
-      </p:sp>
-    </p:spTree>
-    <p:extLst>
-      <p:ext uri="{BB962C8B-B14F-4D97-AF65-F5344CB8AC3E}">
-        <p14:creationId xmlns:p14="http://schemas.microsoft.com/office/powerpoint/2010/main" val="588330989"/>
-      </p:ext>
-    </p:extLst>
-  </p:cSld>
-  <p:clrMapOvr>
-    <a:masterClrMapping/>
-  </p:clrMapOvr>
-</p:sld>
-</file>
-
-<file path=ppt/slides/slide19.xml><?xml version="1.0" encoding="utf-8"?>
-<p:sld xmlns:a="http://schemas.openxmlformats.org/drawingml/2006/main" xmlns:r="http://schemas.openxmlformats.org/officeDocument/2006/relationships" xmlns:p="http://schemas.openxmlformats.org/presentationml/2006/main">
-  <p:cSld>
-    <p:spTree>
-      <p:nvGrpSpPr>
-        <p:cNvPr id="1" name=""/>
-        <p:cNvGrpSpPr/>
-        <p:nvPr/>
-      </p:nvGrpSpPr>
-      <p:grpSpPr>
-        <a:xfrm>
-          <a:off x="0" y="0"/>
-          <a:ext cx="0" cy="0"/>
-          <a:chOff x="0" y="0"/>
-          <a:chExt cx="0" cy="0"/>
-        </a:xfrm>
-      </p:grpSpPr>
-      <p:sp>
-        <p:nvSpPr>
-          <p:cNvPr id="4" name="Title 3">
-            <a:extLst>
-              <a:ext uri="{FF2B5EF4-FFF2-40B4-BE49-F238E27FC236}">
-                <a16:creationId xmlns:a16="http://schemas.microsoft.com/office/drawing/2014/main" id="{22CC6396-CEAA-5F01-A0B2-49663740E89F}"/>
-              </a:ext>
-            </a:extLst>
-          </p:cNvPr>
-          <p:cNvSpPr>
-            <a:spLocks noGrp="1"/>
-          </p:cNvSpPr>
-          <p:nvPr>
-            <p:ph type="title"/>
-          </p:nvPr>
-        </p:nvSpPr>
-        <p:spPr/>
-        <p:txBody>
-          <a:bodyPr/>
-          <a:lstStyle/>
-          <a:p>
-            <a:r>
-              <a:rPr lang="en-US" dirty="0"/>
-              <a:t>Code Demo</a:t>
-            </a:r>
-          </a:p>
-        </p:txBody>
-      </p:sp>
-      <p:sp>
-        <p:nvSpPr>
-          <p:cNvPr id="5" name="Slide Number Placeholder 4">
-            <a:extLst>
-              <a:ext uri="{FF2B5EF4-FFF2-40B4-BE49-F238E27FC236}">
-                <a16:creationId xmlns:a16="http://schemas.microsoft.com/office/drawing/2014/main" id="{1DCDE71A-D87D-9F07-D8BB-652CDF585377}"/>
-              </a:ext>
-            </a:extLst>
-          </p:cNvPr>
-          <p:cNvSpPr>
-            <a:spLocks noGrp="1"/>
-          </p:cNvSpPr>
-          <p:nvPr>
-            <p:ph type="sldNum" idx="12"/>
-          </p:nvPr>
-        </p:nvSpPr>
-        <p:spPr/>
-        <p:txBody>
-          <a:bodyPr/>
-          <a:lstStyle/>
-          <a:p>
-            <a:pPr marL="0" lvl="0" indent="0" algn="r" rtl="0">
-              <a:spcBef>
-                <a:spcPts val="0"/>
-              </a:spcBef>
-              <a:spcAft>
-                <a:spcPts val="0"/>
-              </a:spcAft>
-              <a:buNone/>
-            </a:pPr>
-            <a:fld id="{00000000-1234-1234-1234-123412341234}" type="slidenum">
-              <a:rPr lang="en" smtClean="0"/>
-              <a:t>19</a:t>
-            </a:fld>
-            <a:endParaRPr lang="en"/>
-          </a:p>
-        </p:txBody>
-      </p:sp>
-    </p:spTree>
-    <p:extLst>
-      <p:ext uri="{BB962C8B-B14F-4D97-AF65-F5344CB8AC3E}">
-        <p14:creationId xmlns:p14="http://schemas.microsoft.com/office/powerpoint/2010/main" val="3862353941"/>
       </p:ext>
     </p:extLst>
   </p:cSld>
@@ -45947,6 +46117,1168 @@
 </file>
 
 <file path=ppt/slides/slide20.xml><?xml version="1.0" encoding="utf-8"?>
+<p:sld xmlns:a="http://schemas.openxmlformats.org/drawingml/2006/main" xmlns:r="http://schemas.openxmlformats.org/officeDocument/2006/relationships" xmlns:p="http://schemas.openxmlformats.org/presentationml/2006/main">
+  <p:cSld>
+    <p:spTree>
+      <p:nvGrpSpPr>
+        <p:cNvPr id="1" name="Shape 65"/>
+        <p:cNvGrpSpPr/>
+        <p:nvPr/>
+      </p:nvGrpSpPr>
+      <p:grpSpPr>
+        <a:xfrm>
+          <a:off x="0" y="0"/>
+          <a:ext cx="0" cy="0"/>
+          <a:chOff x="0" y="0"/>
+          <a:chExt cx="0" cy="0"/>
+        </a:xfrm>
+      </p:grpSpPr>
+      <p:sp>
+        <p:nvSpPr>
+          <p:cNvPr id="66" name="Google Shape;66;p15"/>
+          <p:cNvSpPr txBox="1">
+            <a:spLocks noGrp="1"/>
+          </p:cNvSpPr>
+          <p:nvPr>
+            <p:ph type="title"/>
+          </p:nvPr>
+        </p:nvSpPr>
+        <p:spPr>
+          <a:prstGeom prst="rect">
+            <a:avLst/>
+          </a:prstGeom>
+        </p:spPr>
+        <p:txBody>
+          <a:bodyPr spcFirstLastPara="1" wrap="square" lIns="91425" tIns="91425" rIns="91425" bIns="91425" anchor="t" anchorCtr="0">
+            <a:normAutofit/>
+          </a:bodyPr>
+          <a:lstStyle/>
+          <a:p>
+            <a:pPr marL="0" lvl="0" indent="0" algn="l" rtl="0">
+              <a:spcBef>
+                <a:spcPts val="0"/>
+              </a:spcBef>
+              <a:spcAft>
+                <a:spcPts val="0"/>
+              </a:spcAft>
+              <a:buNone/>
+            </a:pPr>
+            <a:r>
+              <a:rPr lang="pt-PT" dirty="0" err="1"/>
+              <a:t>Task</a:t>
+            </a:r>
+            <a:r>
+              <a:rPr lang="pt-PT" dirty="0"/>
+              <a:t> [2.2] - </a:t>
+            </a:r>
+            <a:r>
+              <a:rPr lang="pt-PT"/>
+              <a:t>Evaluation</a:t>
+            </a:r>
+            <a:endParaRPr lang="pt-PT" dirty="0"/>
+          </a:p>
+        </p:txBody>
+      </p:sp>
+      <p:sp>
+        <p:nvSpPr>
+          <p:cNvPr id="2" name="Slide Number Placeholder 1">
+            <a:extLst>
+              <a:ext uri="{FF2B5EF4-FFF2-40B4-BE49-F238E27FC236}">
+                <a16:creationId xmlns:a16="http://schemas.microsoft.com/office/drawing/2014/main" id="{2F02ADCD-40A6-0FDE-3F7E-7E3EFE9B8615}"/>
+              </a:ext>
+            </a:extLst>
+          </p:cNvPr>
+          <p:cNvSpPr>
+            <a:spLocks noGrp="1"/>
+          </p:cNvSpPr>
+          <p:nvPr>
+            <p:ph type="sldNum" idx="12"/>
+          </p:nvPr>
+        </p:nvSpPr>
+        <p:spPr/>
+        <p:txBody>
+          <a:bodyPr/>
+          <a:lstStyle/>
+          <a:p>
+            <a:pPr marL="0" lvl="0" indent="0" algn="r" rtl="0">
+              <a:spcBef>
+                <a:spcPts val="0"/>
+              </a:spcBef>
+              <a:spcAft>
+                <a:spcPts val="0"/>
+              </a:spcAft>
+              <a:buNone/>
+            </a:pPr>
+            <a:fld id="{00000000-1234-1234-1234-123412341234}" type="slidenum">
+              <a:rPr lang="en" smtClean="0"/>
+              <a:t>20</a:t>
+            </a:fld>
+            <a:endParaRPr lang="en"/>
+          </a:p>
+        </p:txBody>
+      </p:sp>
+    </p:spTree>
+    <p:extLst>
+      <p:ext uri="{BB962C8B-B14F-4D97-AF65-F5344CB8AC3E}">
+        <p14:creationId xmlns:p14="http://schemas.microsoft.com/office/powerpoint/2010/main" val="359010921"/>
+      </p:ext>
+    </p:extLst>
+  </p:cSld>
+  <p:clrMapOvr>
+    <a:masterClrMapping/>
+  </p:clrMapOvr>
+</p:sld>
+</file>
+
+<file path=ppt/slides/slide21.xml><?xml version="1.0" encoding="utf-8"?>
+<p:sld xmlns:a="http://schemas.openxmlformats.org/drawingml/2006/main" xmlns:r="http://schemas.openxmlformats.org/officeDocument/2006/relationships" xmlns:p="http://schemas.openxmlformats.org/presentationml/2006/main">
+  <p:cSld>
+    <p:spTree>
+      <p:nvGrpSpPr>
+        <p:cNvPr id="1" name=""/>
+        <p:cNvGrpSpPr/>
+        <p:nvPr/>
+      </p:nvGrpSpPr>
+      <p:grpSpPr>
+        <a:xfrm>
+          <a:off x="0" y="0"/>
+          <a:ext cx="0" cy="0"/>
+          <a:chOff x="0" y="0"/>
+          <a:chExt cx="0" cy="0"/>
+        </a:xfrm>
+      </p:grpSpPr>
+      <p:sp>
+        <p:nvSpPr>
+          <p:cNvPr id="2" name="Título 1">
+            <a:extLst>
+              <a:ext uri="{FF2B5EF4-FFF2-40B4-BE49-F238E27FC236}">
+                <a16:creationId xmlns:a16="http://schemas.microsoft.com/office/drawing/2014/main" id="{435950B8-3572-2171-184D-7CB447F81866}"/>
+              </a:ext>
+            </a:extLst>
+          </p:cNvPr>
+          <p:cNvSpPr>
+            <a:spLocks noGrp="1"/>
+          </p:cNvSpPr>
+          <p:nvPr>
+            <p:ph type="title"/>
+          </p:nvPr>
+        </p:nvSpPr>
+        <p:spPr>
+          <a:xfrm>
+            <a:off x="311700" y="445025"/>
+            <a:ext cx="8520600" cy="572700"/>
+          </a:xfrm>
+        </p:spPr>
+        <p:txBody>
+          <a:bodyPr wrap="square" anchor="ctr">
+            <a:normAutofit/>
+          </a:bodyPr>
+          <a:lstStyle/>
+          <a:p>
+            <a:pPr>
+              <a:lnSpc>
+                <a:spcPct val="90000"/>
+              </a:lnSpc>
+            </a:pPr>
+            <a:r>
+              <a:rPr lang="en-US" sz="2600" dirty="0"/>
+              <a:t>What was done in task [2.2]</a:t>
+            </a:r>
+            <a:endParaRPr lang="pt-PT" sz="2600" dirty="0"/>
+          </a:p>
+        </p:txBody>
+      </p:sp>
+      <p:sp>
+        <p:nvSpPr>
+          <p:cNvPr id="4" name="Slide Number Placeholder 3">
+            <a:extLst>
+              <a:ext uri="{FF2B5EF4-FFF2-40B4-BE49-F238E27FC236}">
+                <a16:creationId xmlns:a16="http://schemas.microsoft.com/office/drawing/2014/main" id="{EF6583C8-87CC-4DDC-5CE6-18034C27EBE7}"/>
+              </a:ext>
+            </a:extLst>
+          </p:cNvPr>
+          <p:cNvSpPr>
+            <a:spLocks noGrp="1"/>
+          </p:cNvSpPr>
+          <p:nvPr>
+            <p:ph type="sldNum" idx="12"/>
+          </p:nvPr>
+        </p:nvSpPr>
+        <p:spPr>
+          <a:xfrm>
+            <a:off x="8472458" y="4663217"/>
+            <a:ext cx="548700" cy="393600"/>
+          </a:xfrm>
+        </p:spPr>
+        <p:txBody>
+          <a:bodyPr wrap="square" anchor="ctr">
+            <a:normAutofit/>
+          </a:bodyPr>
+          <a:lstStyle/>
+          <a:p>
+            <a:pPr marL="0" lvl="0" indent="0" rtl="0">
+              <a:lnSpc>
+                <a:spcPct val="90000"/>
+              </a:lnSpc>
+              <a:spcBef>
+                <a:spcPts val="0"/>
+              </a:spcBef>
+              <a:spcAft>
+                <a:spcPts val="600"/>
+              </a:spcAft>
+              <a:buNone/>
+            </a:pPr>
+            <a:fld id="{00000000-1234-1234-1234-123412341234}" type="slidenum">
+              <a:rPr lang="en" sz="900" smtClean="0"/>
+              <a:pPr marL="0" lvl="0" indent="0" rtl="0">
+                <a:lnSpc>
+                  <a:spcPct val="90000"/>
+                </a:lnSpc>
+                <a:spcBef>
+                  <a:spcPts val="0"/>
+                </a:spcBef>
+                <a:spcAft>
+                  <a:spcPts val="600"/>
+                </a:spcAft>
+                <a:buNone/>
+              </a:pPr>
+              <a:t>21</a:t>
+            </a:fld>
+            <a:endParaRPr lang="en" sz="900"/>
+          </a:p>
+        </p:txBody>
+      </p:sp>
+      <p:graphicFrame>
+        <p:nvGraphicFramePr>
+          <p:cNvPr id="9" name="Marcador de Posição do Texto 6">
+            <a:extLst>
+              <a:ext uri="{FF2B5EF4-FFF2-40B4-BE49-F238E27FC236}">
+                <a16:creationId xmlns:a16="http://schemas.microsoft.com/office/drawing/2014/main" id="{E2B6C4B8-F8C0-E9B5-3A6C-7B2C6AE4899D}"/>
+              </a:ext>
+            </a:extLst>
+          </p:cNvPr>
+          <p:cNvGraphicFramePr/>
+          <p:nvPr>
+            <p:extLst>
+              <p:ext uri="{D42A27DB-BD31-4B8C-83A1-F6EECF244321}">
+                <p14:modId xmlns:p14="http://schemas.microsoft.com/office/powerpoint/2010/main" val="1237431737"/>
+              </p:ext>
+            </p:extLst>
+          </p:nvPr>
+        </p:nvGraphicFramePr>
+        <p:xfrm>
+          <a:off x="311700" y="1208225"/>
+          <a:ext cx="8520600" cy="3264408"/>
+        </p:xfrm>
+        <a:graphic>
+          <a:graphicData uri="http://schemas.openxmlformats.org/drawingml/2006/diagram">
+            <dgm:relIds xmlns:dgm="http://schemas.openxmlformats.org/drawingml/2006/diagram" xmlns:r="http://schemas.openxmlformats.org/officeDocument/2006/relationships" r:dm="rId2" r:lo="rId3" r:qs="rId4" r:cs="rId5"/>
+          </a:graphicData>
+        </a:graphic>
+      </p:graphicFrame>
+    </p:spTree>
+    <p:extLst>
+      <p:ext uri="{BB962C8B-B14F-4D97-AF65-F5344CB8AC3E}">
+        <p14:creationId xmlns:p14="http://schemas.microsoft.com/office/powerpoint/2010/main" val="568520892"/>
+      </p:ext>
+    </p:extLst>
+  </p:cSld>
+  <p:clrMapOvr>
+    <a:masterClrMapping/>
+  </p:clrMapOvr>
+</p:sld>
+</file>
+
+<file path=ppt/slides/slide22.xml><?xml version="1.0" encoding="utf-8"?>
+<p:sld xmlns:a="http://schemas.openxmlformats.org/drawingml/2006/main" xmlns:r="http://schemas.openxmlformats.org/officeDocument/2006/relationships" xmlns:p="http://schemas.openxmlformats.org/presentationml/2006/main">
+  <p:cSld>
+    <p:spTree>
+      <p:nvGrpSpPr>
+        <p:cNvPr id="1" name=""/>
+        <p:cNvGrpSpPr/>
+        <p:nvPr/>
+      </p:nvGrpSpPr>
+      <p:grpSpPr>
+        <a:xfrm>
+          <a:off x="0" y="0"/>
+          <a:ext cx="0" cy="0"/>
+          <a:chOff x="0" y="0"/>
+          <a:chExt cx="0" cy="0"/>
+        </a:xfrm>
+      </p:grpSpPr>
+      <p:sp>
+        <p:nvSpPr>
+          <p:cNvPr id="2" name="Título 1">
+            <a:extLst>
+              <a:ext uri="{FF2B5EF4-FFF2-40B4-BE49-F238E27FC236}">
+                <a16:creationId xmlns:a16="http://schemas.microsoft.com/office/drawing/2014/main" id="{18C61B6A-344B-35E3-3F42-0EB9D63698C5}"/>
+              </a:ext>
+            </a:extLst>
+          </p:cNvPr>
+          <p:cNvSpPr>
+            <a:spLocks noGrp="1"/>
+          </p:cNvSpPr>
+          <p:nvPr>
+            <p:ph type="title"/>
+          </p:nvPr>
+        </p:nvSpPr>
+        <p:spPr>
+          <a:xfrm>
+            <a:off x="311700" y="445025"/>
+            <a:ext cx="8520600" cy="572700"/>
+          </a:xfrm>
+        </p:spPr>
+        <p:txBody>
+          <a:bodyPr wrap="square" anchor="ctr">
+            <a:normAutofit/>
+          </a:bodyPr>
+          <a:lstStyle/>
+          <a:p>
+            <a:pPr>
+              <a:lnSpc>
+                <a:spcPct val="90000"/>
+              </a:lnSpc>
+            </a:pPr>
+            <a:r>
+              <a:rPr lang="en-US" sz="2600" dirty="0"/>
+              <a:t>What was done in task [2.2]</a:t>
+            </a:r>
+            <a:endParaRPr lang="pt-PT" sz="2600" dirty="0"/>
+          </a:p>
+        </p:txBody>
+      </p:sp>
+      <p:sp>
+        <p:nvSpPr>
+          <p:cNvPr id="4" name="Slide Number Placeholder 3">
+            <a:extLst>
+              <a:ext uri="{FF2B5EF4-FFF2-40B4-BE49-F238E27FC236}">
+                <a16:creationId xmlns:a16="http://schemas.microsoft.com/office/drawing/2014/main" id="{11770F1A-57B0-9DBE-C4C9-21E2A31A698E}"/>
+              </a:ext>
+            </a:extLst>
+          </p:cNvPr>
+          <p:cNvSpPr>
+            <a:spLocks noGrp="1"/>
+          </p:cNvSpPr>
+          <p:nvPr>
+            <p:ph type="sldNum" idx="12"/>
+          </p:nvPr>
+        </p:nvSpPr>
+        <p:spPr>
+          <a:xfrm>
+            <a:off x="8472458" y="4663217"/>
+            <a:ext cx="548700" cy="393600"/>
+          </a:xfrm>
+        </p:spPr>
+        <p:txBody>
+          <a:bodyPr wrap="square" anchor="ctr">
+            <a:normAutofit/>
+          </a:bodyPr>
+          <a:lstStyle/>
+          <a:p>
+            <a:pPr marL="0" lvl="0" indent="0" rtl="0">
+              <a:lnSpc>
+                <a:spcPct val="90000"/>
+              </a:lnSpc>
+              <a:spcBef>
+                <a:spcPts val="0"/>
+              </a:spcBef>
+              <a:spcAft>
+                <a:spcPts val="600"/>
+              </a:spcAft>
+              <a:buNone/>
+            </a:pPr>
+            <a:fld id="{00000000-1234-1234-1234-123412341234}" type="slidenum">
+              <a:rPr lang="en" sz="900" smtClean="0"/>
+              <a:pPr marL="0" lvl="0" indent="0" rtl="0">
+                <a:lnSpc>
+                  <a:spcPct val="90000"/>
+                </a:lnSpc>
+                <a:spcBef>
+                  <a:spcPts val="0"/>
+                </a:spcBef>
+                <a:spcAft>
+                  <a:spcPts val="600"/>
+                </a:spcAft>
+                <a:buNone/>
+              </a:pPr>
+              <a:t>22</a:t>
+            </a:fld>
+            <a:endParaRPr lang="en" sz="900"/>
+          </a:p>
+        </p:txBody>
+      </p:sp>
+      <p:graphicFrame>
+        <p:nvGraphicFramePr>
+          <p:cNvPr id="6" name="Marcador de Posição do Texto 2">
+            <a:extLst>
+              <a:ext uri="{FF2B5EF4-FFF2-40B4-BE49-F238E27FC236}">
+                <a16:creationId xmlns:a16="http://schemas.microsoft.com/office/drawing/2014/main" id="{174D7F8E-0400-296E-1442-1558F0A4E179}"/>
+              </a:ext>
+            </a:extLst>
+          </p:cNvPr>
+          <p:cNvGraphicFramePr/>
+          <p:nvPr>
+            <p:extLst>
+              <p:ext uri="{D42A27DB-BD31-4B8C-83A1-F6EECF244321}">
+                <p14:modId xmlns:p14="http://schemas.microsoft.com/office/powerpoint/2010/main" val="1107985695"/>
+              </p:ext>
+            </p:extLst>
+          </p:nvPr>
+        </p:nvGraphicFramePr>
+        <p:xfrm>
+          <a:off x="311700" y="1208225"/>
+          <a:ext cx="8520600" cy="3264408"/>
+        </p:xfrm>
+        <a:graphic>
+          <a:graphicData uri="http://schemas.openxmlformats.org/drawingml/2006/diagram">
+            <dgm:relIds xmlns:dgm="http://schemas.openxmlformats.org/drawingml/2006/diagram" xmlns:r="http://schemas.openxmlformats.org/officeDocument/2006/relationships" r:dm="rId2" r:lo="rId3" r:qs="rId4" r:cs="rId5"/>
+          </a:graphicData>
+        </a:graphic>
+      </p:graphicFrame>
+    </p:spTree>
+    <p:extLst>
+      <p:ext uri="{BB962C8B-B14F-4D97-AF65-F5344CB8AC3E}">
+        <p14:creationId xmlns:p14="http://schemas.microsoft.com/office/powerpoint/2010/main" val="3985955342"/>
+      </p:ext>
+    </p:extLst>
+  </p:cSld>
+  <p:clrMapOvr>
+    <a:masterClrMapping/>
+  </p:clrMapOvr>
+</p:sld>
+</file>
+
+<file path=ppt/slides/slide23.xml><?xml version="1.0" encoding="utf-8"?>
+<p:sld xmlns:a="http://schemas.openxmlformats.org/drawingml/2006/main" xmlns:r="http://schemas.openxmlformats.org/officeDocument/2006/relationships" xmlns:p="http://schemas.openxmlformats.org/presentationml/2006/main">
+  <p:cSld>
+    <p:spTree>
+      <p:nvGrpSpPr>
+        <p:cNvPr id="1" name=""/>
+        <p:cNvGrpSpPr/>
+        <p:nvPr/>
+      </p:nvGrpSpPr>
+      <p:grpSpPr>
+        <a:xfrm>
+          <a:off x="0" y="0"/>
+          <a:ext cx="0" cy="0"/>
+          <a:chOff x="0" y="0"/>
+          <a:chExt cx="0" cy="0"/>
+        </a:xfrm>
+      </p:grpSpPr>
+      <p:sp>
+        <p:nvSpPr>
+          <p:cNvPr id="2" name="Título 1">
+            <a:extLst>
+              <a:ext uri="{FF2B5EF4-FFF2-40B4-BE49-F238E27FC236}">
+                <a16:creationId xmlns:a16="http://schemas.microsoft.com/office/drawing/2014/main" id="{18C61B6A-344B-35E3-3F42-0EB9D63698C5}"/>
+              </a:ext>
+            </a:extLst>
+          </p:cNvPr>
+          <p:cNvSpPr>
+            <a:spLocks noGrp="1"/>
+          </p:cNvSpPr>
+          <p:nvPr>
+            <p:ph type="title"/>
+          </p:nvPr>
+        </p:nvSpPr>
+        <p:spPr/>
+        <p:txBody>
+          <a:bodyPr>
+            <a:normAutofit fontScale="90000"/>
+          </a:bodyPr>
+          <a:lstStyle/>
+          <a:p>
+            <a:r>
+              <a:rPr lang="en-US" dirty="0"/>
+              <a:t>Results and Analysis from task [2.2]</a:t>
+            </a:r>
+            <a:endParaRPr lang="pt-PT" dirty="0"/>
+          </a:p>
+        </p:txBody>
+      </p:sp>
+      <p:sp>
+        <p:nvSpPr>
+          <p:cNvPr id="3" name="Marcador de Posição do Texto 2">
+            <a:extLst>
+              <a:ext uri="{FF2B5EF4-FFF2-40B4-BE49-F238E27FC236}">
+                <a16:creationId xmlns:a16="http://schemas.microsoft.com/office/drawing/2014/main" id="{A5BD8CCC-C62C-448E-5E03-7432197F63FB}"/>
+              </a:ext>
+            </a:extLst>
+          </p:cNvPr>
+          <p:cNvSpPr>
+            <a:spLocks noGrp="1"/>
+          </p:cNvSpPr>
+          <p:nvPr>
+            <p:ph type="body" idx="1"/>
+          </p:nvPr>
+        </p:nvSpPr>
+        <p:spPr/>
+        <p:txBody>
+          <a:bodyPr/>
+          <a:lstStyle/>
+          <a:p>
+            <a:endParaRPr lang="pt-PT" dirty="0"/>
+          </a:p>
+        </p:txBody>
+      </p:sp>
+      <p:sp>
+        <p:nvSpPr>
+          <p:cNvPr id="4" name="Slide Number Placeholder 3">
+            <a:extLst>
+              <a:ext uri="{FF2B5EF4-FFF2-40B4-BE49-F238E27FC236}">
+                <a16:creationId xmlns:a16="http://schemas.microsoft.com/office/drawing/2014/main" id="{11770F1A-57B0-9DBE-C4C9-21E2A31A698E}"/>
+              </a:ext>
+            </a:extLst>
+          </p:cNvPr>
+          <p:cNvSpPr>
+            <a:spLocks noGrp="1"/>
+          </p:cNvSpPr>
+          <p:nvPr>
+            <p:ph type="sldNum" idx="12"/>
+          </p:nvPr>
+        </p:nvSpPr>
+        <p:spPr/>
+        <p:txBody>
+          <a:bodyPr/>
+          <a:lstStyle/>
+          <a:p>
+            <a:pPr marL="0" lvl="0" indent="0" algn="r" rtl="0">
+              <a:spcBef>
+                <a:spcPts val="0"/>
+              </a:spcBef>
+              <a:spcAft>
+                <a:spcPts val="0"/>
+              </a:spcAft>
+              <a:buNone/>
+            </a:pPr>
+            <a:fld id="{00000000-1234-1234-1234-123412341234}" type="slidenum">
+              <a:rPr lang="en" smtClean="0"/>
+              <a:t>23</a:t>
+            </a:fld>
+            <a:endParaRPr lang="en"/>
+          </a:p>
+        </p:txBody>
+      </p:sp>
+      <p:pic>
+        <p:nvPicPr>
+          <p:cNvPr id="6" name="Imagem 5" descr="Uma imagem com Gráfico, file, texto, diagrama&#10;&#10;Os conteúdos gerados por IA podem estar incorretos.">
+            <a:extLst>
+              <a:ext uri="{FF2B5EF4-FFF2-40B4-BE49-F238E27FC236}">
+                <a16:creationId xmlns:a16="http://schemas.microsoft.com/office/drawing/2014/main" id="{B6E4AD41-0CE5-75EC-7747-9BD003896DBF}"/>
+              </a:ext>
+            </a:extLst>
+          </p:cNvPr>
+          <p:cNvPicPr>
+            <a:picLocks noChangeAspect="1"/>
+          </p:cNvPicPr>
+          <p:nvPr/>
+        </p:nvPicPr>
+        <p:blipFill>
+          <a:blip r:embed="rId2"/>
+          <a:stretch>
+            <a:fillRect/>
+          </a:stretch>
+        </p:blipFill>
+        <p:spPr>
+          <a:xfrm>
+            <a:off x="616016" y="1195206"/>
+            <a:ext cx="7719461" cy="2531707"/>
+          </a:xfrm>
+          <a:prstGeom prst="rect">
+            <a:avLst/>
+          </a:prstGeom>
+        </p:spPr>
+      </p:pic>
+    </p:spTree>
+    <p:extLst>
+      <p:ext uri="{BB962C8B-B14F-4D97-AF65-F5344CB8AC3E}">
+        <p14:creationId xmlns:p14="http://schemas.microsoft.com/office/powerpoint/2010/main" val="588330989"/>
+      </p:ext>
+    </p:extLst>
+  </p:cSld>
+  <p:clrMapOvr>
+    <a:masterClrMapping/>
+  </p:clrMapOvr>
+</p:sld>
+</file>
+
+<file path=ppt/slides/slide24.xml><?xml version="1.0" encoding="utf-8"?>
+<p:sld xmlns:a="http://schemas.openxmlformats.org/drawingml/2006/main" xmlns:r="http://schemas.openxmlformats.org/officeDocument/2006/relationships" xmlns:p="http://schemas.openxmlformats.org/presentationml/2006/main">
+  <p:cSld>
+    <p:spTree>
+      <p:nvGrpSpPr>
+        <p:cNvPr id="1" name="">
+          <a:extLst>
+            <a:ext uri="{FF2B5EF4-FFF2-40B4-BE49-F238E27FC236}">
+              <a16:creationId xmlns:a16="http://schemas.microsoft.com/office/drawing/2014/main" id="{CC192A7E-20B1-5855-1A97-3B3D4E7B2B0F}"/>
+            </a:ext>
+          </a:extLst>
+        </p:cNvPr>
+        <p:cNvGrpSpPr/>
+        <p:nvPr/>
+      </p:nvGrpSpPr>
+      <p:grpSpPr>
+        <a:xfrm>
+          <a:off x="0" y="0"/>
+          <a:ext cx="0" cy="0"/>
+          <a:chOff x="0" y="0"/>
+          <a:chExt cx="0" cy="0"/>
+        </a:xfrm>
+      </p:grpSpPr>
+      <p:sp>
+        <p:nvSpPr>
+          <p:cNvPr id="2" name="Título 1">
+            <a:extLst>
+              <a:ext uri="{FF2B5EF4-FFF2-40B4-BE49-F238E27FC236}">
+                <a16:creationId xmlns:a16="http://schemas.microsoft.com/office/drawing/2014/main" id="{39F55ED8-63BA-75DA-A065-40F5381C64C0}"/>
+              </a:ext>
+            </a:extLst>
+          </p:cNvPr>
+          <p:cNvSpPr>
+            <a:spLocks noGrp="1"/>
+          </p:cNvSpPr>
+          <p:nvPr>
+            <p:ph type="title"/>
+          </p:nvPr>
+        </p:nvSpPr>
+        <p:spPr/>
+        <p:txBody>
+          <a:bodyPr>
+            <a:normAutofit fontScale="90000"/>
+          </a:bodyPr>
+          <a:lstStyle/>
+          <a:p>
+            <a:r>
+              <a:rPr lang="en-US" dirty="0"/>
+              <a:t>Results and Analysis from task [2.2]</a:t>
+            </a:r>
+            <a:endParaRPr lang="pt-PT" dirty="0"/>
+          </a:p>
+        </p:txBody>
+      </p:sp>
+      <p:sp>
+        <p:nvSpPr>
+          <p:cNvPr id="3" name="Marcador de Posição do Texto 2">
+            <a:extLst>
+              <a:ext uri="{FF2B5EF4-FFF2-40B4-BE49-F238E27FC236}">
+                <a16:creationId xmlns:a16="http://schemas.microsoft.com/office/drawing/2014/main" id="{64B26AC2-46B1-50C8-C0EA-73B5A9812CA7}"/>
+              </a:ext>
+            </a:extLst>
+          </p:cNvPr>
+          <p:cNvSpPr>
+            <a:spLocks noGrp="1"/>
+          </p:cNvSpPr>
+          <p:nvPr>
+            <p:ph type="body" idx="1"/>
+          </p:nvPr>
+        </p:nvSpPr>
+        <p:spPr/>
+        <p:txBody>
+          <a:bodyPr/>
+          <a:lstStyle/>
+          <a:p>
+            <a:endParaRPr lang="pt-PT" dirty="0"/>
+          </a:p>
+        </p:txBody>
+      </p:sp>
+      <p:sp>
+        <p:nvSpPr>
+          <p:cNvPr id="4" name="Slide Number Placeholder 3">
+            <a:extLst>
+              <a:ext uri="{FF2B5EF4-FFF2-40B4-BE49-F238E27FC236}">
+                <a16:creationId xmlns:a16="http://schemas.microsoft.com/office/drawing/2014/main" id="{D0DF76B7-FD20-A223-51A3-FBAFD90A7D43}"/>
+              </a:ext>
+            </a:extLst>
+          </p:cNvPr>
+          <p:cNvSpPr>
+            <a:spLocks noGrp="1"/>
+          </p:cNvSpPr>
+          <p:nvPr>
+            <p:ph type="sldNum" idx="12"/>
+          </p:nvPr>
+        </p:nvSpPr>
+        <p:spPr/>
+        <p:txBody>
+          <a:bodyPr/>
+          <a:lstStyle/>
+          <a:p>
+            <a:pPr marL="0" lvl="0" indent="0" algn="r" rtl="0">
+              <a:spcBef>
+                <a:spcPts val="0"/>
+              </a:spcBef>
+              <a:spcAft>
+                <a:spcPts val="0"/>
+              </a:spcAft>
+              <a:buNone/>
+            </a:pPr>
+            <a:fld id="{00000000-1234-1234-1234-123412341234}" type="slidenum">
+              <a:rPr lang="en" smtClean="0"/>
+              <a:t>24</a:t>
+            </a:fld>
+            <a:endParaRPr lang="en"/>
+          </a:p>
+        </p:txBody>
+      </p:sp>
+      <p:pic>
+        <p:nvPicPr>
+          <p:cNvPr id="6" name="Imagem 5" descr="Uma imagem com texto, Gráfico, file, diagrama&#10;&#10;Os conteúdos gerados por IA podem estar incorretos.">
+            <a:extLst>
+              <a:ext uri="{FF2B5EF4-FFF2-40B4-BE49-F238E27FC236}">
+                <a16:creationId xmlns:a16="http://schemas.microsoft.com/office/drawing/2014/main" id="{BD8B902B-4B03-84AC-475E-B9BCA3AFE4DF}"/>
+              </a:ext>
+            </a:extLst>
+          </p:cNvPr>
+          <p:cNvPicPr>
+            <a:picLocks noChangeAspect="1"/>
+          </p:cNvPicPr>
+          <p:nvPr/>
+        </p:nvPicPr>
+        <p:blipFill>
+          <a:blip r:embed="rId2"/>
+          <a:stretch>
+            <a:fillRect/>
+          </a:stretch>
+        </p:blipFill>
+        <p:spPr>
+          <a:xfrm>
+            <a:off x="2417152" y="1152475"/>
+            <a:ext cx="4309695" cy="3198630"/>
+          </a:xfrm>
+          <a:prstGeom prst="rect">
+            <a:avLst/>
+          </a:prstGeom>
+        </p:spPr>
+      </p:pic>
+    </p:spTree>
+    <p:extLst>
+      <p:ext uri="{BB962C8B-B14F-4D97-AF65-F5344CB8AC3E}">
+        <p14:creationId xmlns:p14="http://schemas.microsoft.com/office/powerpoint/2010/main" val="1085061628"/>
+      </p:ext>
+    </p:extLst>
+  </p:cSld>
+  <p:clrMapOvr>
+    <a:masterClrMapping/>
+  </p:clrMapOvr>
+</p:sld>
+</file>
+
+<file path=ppt/slides/slide25.xml><?xml version="1.0" encoding="utf-8"?>
+<p:sld xmlns:a="http://schemas.openxmlformats.org/drawingml/2006/main" xmlns:r="http://schemas.openxmlformats.org/officeDocument/2006/relationships" xmlns:p="http://schemas.openxmlformats.org/presentationml/2006/main">
+  <p:cSld>
+    <p:spTree>
+      <p:nvGrpSpPr>
+        <p:cNvPr id="1" name="">
+          <a:extLst>
+            <a:ext uri="{FF2B5EF4-FFF2-40B4-BE49-F238E27FC236}">
+              <a16:creationId xmlns:a16="http://schemas.microsoft.com/office/drawing/2014/main" id="{B5B88D94-C361-44B0-2CCB-181514307644}"/>
+            </a:ext>
+          </a:extLst>
+        </p:cNvPr>
+        <p:cNvGrpSpPr/>
+        <p:nvPr/>
+      </p:nvGrpSpPr>
+      <p:grpSpPr>
+        <a:xfrm>
+          <a:off x="0" y="0"/>
+          <a:ext cx="0" cy="0"/>
+          <a:chOff x="0" y="0"/>
+          <a:chExt cx="0" cy="0"/>
+        </a:xfrm>
+      </p:grpSpPr>
+      <p:sp>
+        <p:nvSpPr>
+          <p:cNvPr id="2" name="Título 1">
+            <a:extLst>
+              <a:ext uri="{FF2B5EF4-FFF2-40B4-BE49-F238E27FC236}">
+                <a16:creationId xmlns:a16="http://schemas.microsoft.com/office/drawing/2014/main" id="{523A635D-16DA-2112-FC22-CA8CE027835E}"/>
+              </a:ext>
+            </a:extLst>
+          </p:cNvPr>
+          <p:cNvSpPr>
+            <a:spLocks noGrp="1"/>
+          </p:cNvSpPr>
+          <p:nvPr>
+            <p:ph type="title"/>
+          </p:nvPr>
+        </p:nvSpPr>
+        <p:spPr/>
+        <p:txBody>
+          <a:bodyPr>
+            <a:normAutofit fontScale="90000"/>
+          </a:bodyPr>
+          <a:lstStyle/>
+          <a:p>
+            <a:r>
+              <a:rPr lang="en-US" dirty="0"/>
+              <a:t>Results and Analysis from task [2.2]</a:t>
+            </a:r>
+            <a:endParaRPr lang="pt-PT" dirty="0"/>
+          </a:p>
+        </p:txBody>
+      </p:sp>
+      <p:sp>
+        <p:nvSpPr>
+          <p:cNvPr id="3" name="Marcador de Posição do Texto 2">
+            <a:extLst>
+              <a:ext uri="{FF2B5EF4-FFF2-40B4-BE49-F238E27FC236}">
+                <a16:creationId xmlns:a16="http://schemas.microsoft.com/office/drawing/2014/main" id="{7FE5A4F9-5578-342C-0029-9BD85600D0FE}"/>
+              </a:ext>
+            </a:extLst>
+          </p:cNvPr>
+          <p:cNvSpPr>
+            <a:spLocks noGrp="1"/>
+          </p:cNvSpPr>
+          <p:nvPr>
+            <p:ph type="body" idx="1"/>
+          </p:nvPr>
+        </p:nvSpPr>
+        <p:spPr/>
+        <p:txBody>
+          <a:bodyPr/>
+          <a:lstStyle/>
+          <a:p>
+            <a:endParaRPr lang="pt-PT" dirty="0"/>
+          </a:p>
+        </p:txBody>
+      </p:sp>
+      <p:sp>
+        <p:nvSpPr>
+          <p:cNvPr id="4" name="Slide Number Placeholder 3">
+            <a:extLst>
+              <a:ext uri="{FF2B5EF4-FFF2-40B4-BE49-F238E27FC236}">
+                <a16:creationId xmlns:a16="http://schemas.microsoft.com/office/drawing/2014/main" id="{3578F6BB-BD57-7D81-56F0-9EEE0D5B3B91}"/>
+              </a:ext>
+            </a:extLst>
+          </p:cNvPr>
+          <p:cNvSpPr>
+            <a:spLocks noGrp="1"/>
+          </p:cNvSpPr>
+          <p:nvPr>
+            <p:ph type="sldNum" idx="12"/>
+          </p:nvPr>
+        </p:nvSpPr>
+        <p:spPr/>
+        <p:txBody>
+          <a:bodyPr/>
+          <a:lstStyle/>
+          <a:p>
+            <a:pPr marL="0" lvl="0" indent="0" algn="r" rtl="0">
+              <a:spcBef>
+                <a:spcPts val="0"/>
+              </a:spcBef>
+              <a:spcAft>
+                <a:spcPts val="0"/>
+              </a:spcAft>
+              <a:buNone/>
+            </a:pPr>
+            <a:fld id="{00000000-1234-1234-1234-123412341234}" type="slidenum">
+              <a:rPr lang="en" smtClean="0"/>
+              <a:t>25</a:t>
+            </a:fld>
+            <a:endParaRPr lang="en"/>
+          </a:p>
+        </p:txBody>
+      </p:sp>
+      <p:pic>
+        <p:nvPicPr>
+          <p:cNvPr id="6" name="Imagem 5" descr="Uma imagem com texto, Gráfico, file, diagrama&#10;&#10;Os conteúdos gerados por IA podem estar incorretos.">
+            <a:extLst>
+              <a:ext uri="{FF2B5EF4-FFF2-40B4-BE49-F238E27FC236}">
+                <a16:creationId xmlns:a16="http://schemas.microsoft.com/office/drawing/2014/main" id="{170F8F18-AF7F-D862-55F9-C9630787A9B4}"/>
+              </a:ext>
+            </a:extLst>
+          </p:cNvPr>
+          <p:cNvPicPr>
+            <a:picLocks noChangeAspect="1"/>
+          </p:cNvPicPr>
+          <p:nvPr/>
+        </p:nvPicPr>
+        <p:blipFill>
+          <a:blip r:embed="rId2"/>
+          <a:stretch>
+            <a:fillRect/>
+          </a:stretch>
+        </p:blipFill>
+        <p:spPr>
+          <a:xfrm>
+            <a:off x="2310078" y="1017725"/>
+            <a:ext cx="4523843" cy="3357570"/>
+          </a:xfrm>
+          <a:prstGeom prst="rect">
+            <a:avLst/>
+          </a:prstGeom>
+        </p:spPr>
+      </p:pic>
+    </p:spTree>
+    <p:extLst>
+      <p:ext uri="{BB962C8B-B14F-4D97-AF65-F5344CB8AC3E}">
+        <p14:creationId xmlns:p14="http://schemas.microsoft.com/office/powerpoint/2010/main" val="2099148359"/>
+      </p:ext>
+    </p:extLst>
+  </p:cSld>
+  <p:clrMapOvr>
+    <a:masterClrMapping/>
+  </p:clrMapOvr>
+</p:sld>
+</file>
+
+<file path=ppt/slides/slide26.xml><?xml version="1.0" encoding="utf-8"?>
+<p:sld xmlns:a="http://schemas.openxmlformats.org/drawingml/2006/main" xmlns:r="http://schemas.openxmlformats.org/officeDocument/2006/relationships" xmlns:p="http://schemas.openxmlformats.org/presentationml/2006/main">
+  <p:cSld>
+    <p:spTree>
+      <p:nvGrpSpPr>
+        <p:cNvPr id="1" name="">
+          <a:extLst>
+            <a:ext uri="{FF2B5EF4-FFF2-40B4-BE49-F238E27FC236}">
+              <a16:creationId xmlns:a16="http://schemas.microsoft.com/office/drawing/2014/main" id="{17B78616-5317-8D90-36D3-3E1F13FF30A7}"/>
+            </a:ext>
+          </a:extLst>
+        </p:cNvPr>
+        <p:cNvGrpSpPr/>
+        <p:nvPr/>
+      </p:nvGrpSpPr>
+      <p:grpSpPr>
+        <a:xfrm>
+          <a:off x="0" y="0"/>
+          <a:ext cx="0" cy="0"/>
+          <a:chOff x="0" y="0"/>
+          <a:chExt cx="0" cy="0"/>
+        </a:xfrm>
+      </p:grpSpPr>
+      <p:sp>
+        <p:nvSpPr>
+          <p:cNvPr id="2" name="Título 1">
+            <a:extLst>
+              <a:ext uri="{FF2B5EF4-FFF2-40B4-BE49-F238E27FC236}">
+                <a16:creationId xmlns:a16="http://schemas.microsoft.com/office/drawing/2014/main" id="{0B38BD29-29BB-85EE-9627-20B540EBE392}"/>
+              </a:ext>
+            </a:extLst>
+          </p:cNvPr>
+          <p:cNvSpPr>
+            <a:spLocks noGrp="1"/>
+          </p:cNvSpPr>
+          <p:nvPr>
+            <p:ph type="title"/>
+          </p:nvPr>
+        </p:nvSpPr>
+        <p:spPr/>
+        <p:txBody>
+          <a:bodyPr>
+            <a:normAutofit fontScale="90000"/>
+          </a:bodyPr>
+          <a:lstStyle/>
+          <a:p>
+            <a:r>
+              <a:rPr lang="en-US" dirty="0"/>
+              <a:t>Results and Analysis from task [2.2]</a:t>
+            </a:r>
+            <a:endParaRPr lang="pt-PT" dirty="0"/>
+          </a:p>
+        </p:txBody>
+      </p:sp>
+      <p:sp>
+        <p:nvSpPr>
+          <p:cNvPr id="3" name="Marcador de Posição do Texto 2">
+            <a:extLst>
+              <a:ext uri="{FF2B5EF4-FFF2-40B4-BE49-F238E27FC236}">
+                <a16:creationId xmlns:a16="http://schemas.microsoft.com/office/drawing/2014/main" id="{A8CAA558-BDC8-081D-8370-BD5B8B02484C}"/>
+              </a:ext>
+            </a:extLst>
+          </p:cNvPr>
+          <p:cNvSpPr>
+            <a:spLocks noGrp="1"/>
+          </p:cNvSpPr>
+          <p:nvPr>
+            <p:ph type="body" idx="1"/>
+          </p:nvPr>
+        </p:nvSpPr>
+        <p:spPr/>
+        <p:txBody>
+          <a:bodyPr/>
+          <a:lstStyle/>
+          <a:p>
+            <a:endParaRPr lang="pt-PT" dirty="0"/>
+          </a:p>
+        </p:txBody>
+      </p:sp>
+      <p:sp>
+        <p:nvSpPr>
+          <p:cNvPr id="4" name="Slide Number Placeholder 3">
+            <a:extLst>
+              <a:ext uri="{FF2B5EF4-FFF2-40B4-BE49-F238E27FC236}">
+                <a16:creationId xmlns:a16="http://schemas.microsoft.com/office/drawing/2014/main" id="{71EE8298-D914-8CBF-20FB-5C818E45B017}"/>
+              </a:ext>
+            </a:extLst>
+          </p:cNvPr>
+          <p:cNvSpPr>
+            <a:spLocks noGrp="1"/>
+          </p:cNvSpPr>
+          <p:nvPr>
+            <p:ph type="sldNum" idx="12"/>
+          </p:nvPr>
+        </p:nvSpPr>
+        <p:spPr/>
+        <p:txBody>
+          <a:bodyPr/>
+          <a:lstStyle/>
+          <a:p>
+            <a:pPr marL="0" lvl="0" indent="0" algn="r" rtl="0">
+              <a:spcBef>
+                <a:spcPts val="0"/>
+              </a:spcBef>
+              <a:spcAft>
+                <a:spcPts val="0"/>
+              </a:spcAft>
+              <a:buNone/>
+            </a:pPr>
+            <a:fld id="{00000000-1234-1234-1234-123412341234}" type="slidenum">
+              <a:rPr lang="en" smtClean="0"/>
+              <a:t>26</a:t>
+            </a:fld>
+            <a:endParaRPr lang="en"/>
+          </a:p>
+        </p:txBody>
+      </p:sp>
+      <p:pic>
+        <p:nvPicPr>
+          <p:cNvPr id="6" name="Imagem 5" descr="Uma imagem com texto, file, Gráfico, Tipo de letra&#10;&#10;Os conteúdos gerados por IA podem estar incorretos.">
+            <a:extLst>
+              <a:ext uri="{FF2B5EF4-FFF2-40B4-BE49-F238E27FC236}">
+                <a16:creationId xmlns:a16="http://schemas.microsoft.com/office/drawing/2014/main" id="{48E1BDF3-D4D2-003F-5DA4-3438CEE63321}"/>
+              </a:ext>
+            </a:extLst>
+          </p:cNvPr>
+          <p:cNvPicPr>
+            <a:picLocks noChangeAspect="1"/>
+          </p:cNvPicPr>
+          <p:nvPr/>
+        </p:nvPicPr>
+        <p:blipFill>
+          <a:blip r:embed="rId2"/>
+          <a:stretch>
+            <a:fillRect/>
+          </a:stretch>
+        </p:blipFill>
+        <p:spPr>
+          <a:xfrm>
+            <a:off x="1155031" y="1194808"/>
+            <a:ext cx="6833937" cy="1856743"/>
+          </a:xfrm>
+          <a:prstGeom prst="rect">
+            <a:avLst/>
+          </a:prstGeom>
+        </p:spPr>
+      </p:pic>
+    </p:spTree>
+    <p:extLst>
+      <p:ext uri="{BB962C8B-B14F-4D97-AF65-F5344CB8AC3E}">
+        <p14:creationId xmlns:p14="http://schemas.microsoft.com/office/powerpoint/2010/main" val="1599985301"/>
+      </p:ext>
+    </p:extLst>
+  </p:cSld>
+  <p:clrMapOvr>
+    <a:masterClrMapping/>
+  </p:clrMapOvr>
+</p:sld>
+</file>
+
+<file path=ppt/slides/slide27.xml><?xml version="1.0" encoding="utf-8"?>
+<p:sld xmlns:a="http://schemas.openxmlformats.org/drawingml/2006/main" xmlns:r="http://schemas.openxmlformats.org/officeDocument/2006/relationships" xmlns:p="http://schemas.openxmlformats.org/presentationml/2006/main">
+  <p:cSld>
+    <p:spTree>
+      <p:nvGrpSpPr>
+        <p:cNvPr id="1" name=""/>
+        <p:cNvGrpSpPr/>
+        <p:nvPr/>
+      </p:nvGrpSpPr>
+      <p:grpSpPr>
+        <a:xfrm>
+          <a:off x="0" y="0"/>
+          <a:ext cx="0" cy="0"/>
+          <a:chOff x="0" y="0"/>
+          <a:chExt cx="0" cy="0"/>
+        </a:xfrm>
+      </p:grpSpPr>
+      <p:sp>
+        <p:nvSpPr>
+          <p:cNvPr id="4" name="Title 3">
+            <a:extLst>
+              <a:ext uri="{FF2B5EF4-FFF2-40B4-BE49-F238E27FC236}">
+                <a16:creationId xmlns:a16="http://schemas.microsoft.com/office/drawing/2014/main" id="{22CC6396-CEAA-5F01-A0B2-49663740E89F}"/>
+              </a:ext>
+            </a:extLst>
+          </p:cNvPr>
+          <p:cNvSpPr>
+            <a:spLocks noGrp="1"/>
+          </p:cNvSpPr>
+          <p:nvPr>
+            <p:ph type="title"/>
+          </p:nvPr>
+        </p:nvSpPr>
+        <p:spPr/>
+        <p:txBody>
+          <a:bodyPr/>
+          <a:lstStyle/>
+          <a:p>
+            <a:r>
+              <a:rPr lang="en-US" dirty="0"/>
+              <a:t>Code Demo</a:t>
+            </a:r>
+          </a:p>
+        </p:txBody>
+      </p:sp>
+      <p:sp>
+        <p:nvSpPr>
+          <p:cNvPr id="5" name="Slide Number Placeholder 4">
+            <a:extLst>
+              <a:ext uri="{FF2B5EF4-FFF2-40B4-BE49-F238E27FC236}">
+                <a16:creationId xmlns:a16="http://schemas.microsoft.com/office/drawing/2014/main" id="{1DCDE71A-D87D-9F07-D8BB-652CDF585377}"/>
+              </a:ext>
+            </a:extLst>
+          </p:cNvPr>
+          <p:cNvSpPr>
+            <a:spLocks noGrp="1"/>
+          </p:cNvSpPr>
+          <p:nvPr>
+            <p:ph type="sldNum" idx="12"/>
+          </p:nvPr>
+        </p:nvSpPr>
+        <p:spPr/>
+        <p:txBody>
+          <a:bodyPr/>
+          <a:lstStyle/>
+          <a:p>
+            <a:pPr marL="0" lvl="0" indent="0" algn="r" rtl="0">
+              <a:spcBef>
+                <a:spcPts val="0"/>
+              </a:spcBef>
+              <a:spcAft>
+                <a:spcPts val="0"/>
+              </a:spcAft>
+              <a:buNone/>
+            </a:pPr>
+            <a:fld id="{00000000-1234-1234-1234-123412341234}" type="slidenum">
+              <a:rPr lang="en" smtClean="0"/>
+              <a:t>27</a:t>
+            </a:fld>
+            <a:endParaRPr lang="en"/>
+          </a:p>
+        </p:txBody>
+      </p:sp>
+    </p:spTree>
+    <p:extLst>
+      <p:ext uri="{BB962C8B-B14F-4D97-AF65-F5344CB8AC3E}">
+        <p14:creationId xmlns:p14="http://schemas.microsoft.com/office/powerpoint/2010/main" val="3862353941"/>
+      </p:ext>
+    </p:extLst>
+  </p:cSld>
+  <p:clrMapOvr>
+    <a:masterClrMapping/>
+  </p:clrMapOvr>
+</p:sld>
+</file>
+
+<file path=ppt/slides/slide28.xml><?xml version="1.0" encoding="utf-8"?>
 <p:sld xmlns:a="http://schemas.openxmlformats.org/drawingml/2006/main" xmlns:r="http://schemas.openxmlformats.org/officeDocument/2006/relationships" xmlns:p="http://schemas.openxmlformats.org/presentationml/2006/main" show="0">
   <p:cSld>
     <p:spTree>
@@ -46073,7 +47405,7 @@
             </a:pPr>
             <a:fld id="{00000000-1234-1234-1234-123412341234}" type="slidenum">
               <a:rPr lang="en" smtClean="0"/>
-              <a:t>20</a:t>
+              <a:t>28</a:t>
             </a:fld>
             <a:endParaRPr lang="en"/>
           </a:p>
@@ -46092,7 +47424,7 @@
 </p:sld>
 </file>
 
-<file path=ppt/slides/slide21.xml><?xml version="1.0" encoding="utf-8"?>
+<file path=ppt/slides/slide29.xml><?xml version="1.0" encoding="utf-8"?>
 <p:sld xmlns:a="http://schemas.openxmlformats.org/drawingml/2006/main" xmlns:r="http://schemas.openxmlformats.org/officeDocument/2006/relationships" xmlns:p="http://schemas.openxmlformats.org/presentationml/2006/main">
   <p:cSld>
     <p:spTree>
@@ -46170,7 +47502,7 @@
             </a:pPr>
             <a:fld id="{00000000-1234-1234-1234-123412341234}" type="slidenum">
               <a:rPr lang="en" smtClean="0"/>
-              <a:t>21</a:t>
+              <a:t>29</a:t>
             </a:fld>
             <a:endParaRPr lang="en"/>
           </a:p>
@@ -46189,7 +47521,116 @@
 </p:sld>
 </file>
 
-<file path=ppt/slides/slide22.xml><?xml version="1.0" encoding="utf-8"?>
+<file path=ppt/slides/slide3.xml><?xml version="1.0" encoding="utf-8"?>
+<p:sld xmlns:a="http://schemas.openxmlformats.org/drawingml/2006/main" xmlns:r="http://schemas.openxmlformats.org/officeDocument/2006/relationships" xmlns:p="http://schemas.openxmlformats.org/presentationml/2006/main">
+  <p:cSld>
+    <p:spTree>
+      <p:nvGrpSpPr>
+        <p:cNvPr id="1" name="Shape 65"/>
+        <p:cNvGrpSpPr/>
+        <p:nvPr/>
+      </p:nvGrpSpPr>
+      <p:grpSpPr>
+        <a:xfrm>
+          <a:off x="0" y="0"/>
+          <a:ext cx="0" cy="0"/>
+          <a:chOff x="0" y="0"/>
+          <a:chExt cx="0" cy="0"/>
+        </a:xfrm>
+      </p:grpSpPr>
+      <p:sp>
+        <p:nvSpPr>
+          <p:cNvPr id="66" name="Google Shape;66;p15"/>
+          <p:cNvSpPr txBox="1">
+            <a:spLocks noGrp="1"/>
+          </p:cNvSpPr>
+          <p:nvPr>
+            <p:ph type="title"/>
+          </p:nvPr>
+        </p:nvSpPr>
+        <p:spPr>
+          <a:prstGeom prst="rect">
+            <a:avLst/>
+          </a:prstGeom>
+        </p:spPr>
+        <p:txBody>
+          <a:bodyPr spcFirstLastPara="1" wrap="square" lIns="91425" tIns="91425" rIns="91425" bIns="91425" anchor="t" anchorCtr="0">
+            <a:normAutofit fontScale="90000"/>
+          </a:bodyPr>
+          <a:lstStyle/>
+          <a:p>
+            <a:pPr marL="0" lvl="0" indent="0" algn="l" rtl="0">
+              <a:spcBef>
+                <a:spcPts val="0"/>
+              </a:spcBef>
+              <a:spcAft>
+                <a:spcPts val="0"/>
+              </a:spcAft>
+              <a:buNone/>
+            </a:pPr>
+            <a:r>
+              <a:rPr lang="pt-PT" dirty="0" err="1"/>
+              <a:t>Task</a:t>
+            </a:r>
+            <a:r>
+              <a:rPr lang="pt-PT" dirty="0"/>
+              <a:t> [1.1] - </a:t>
+            </a:r>
+            <a:r>
+              <a:rPr lang="en-US" dirty="0"/>
+              <a:t>Data preparation and validation pipeline</a:t>
+            </a:r>
+            <a:endParaRPr lang="pt-PT" dirty="0"/>
+          </a:p>
+        </p:txBody>
+      </p:sp>
+      <p:sp>
+        <p:nvSpPr>
+          <p:cNvPr id="2" name="Slide Number Placeholder 1">
+            <a:extLst>
+              <a:ext uri="{FF2B5EF4-FFF2-40B4-BE49-F238E27FC236}">
+                <a16:creationId xmlns:a16="http://schemas.microsoft.com/office/drawing/2014/main" id="{2F02ADCD-40A6-0FDE-3F7E-7E3EFE9B8615}"/>
+              </a:ext>
+            </a:extLst>
+          </p:cNvPr>
+          <p:cNvSpPr>
+            <a:spLocks noGrp="1"/>
+          </p:cNvSpPr>
+          <p:nvPr>
+            <p:ph type="sldNum" idx="12"/>
+          </p:nvPr>
+        </p:nvSpPr>
+        <p:spPr/>
+        <p:txBody>
+          <a:bodyPr/>
+          <a:lstStyle/>
+          <a:p>
+            <a:pPr marL="0" lvl="0" indent="0" algn="r" rtl="0">
+              <a:spcBef>
+                <a:spcPts val="0"/>
+              </a:spcBef>
+              <a:spcAft>
+                <a:spcPts val="0"/>
+              </a:spcAft>
+              <a:buNone/>
+            </a:pPr>
+            <a:fld id="{00000000-1234-1234-1234-123412341234}" type="slidenum">
+              <a:rPr lang="en" smtClean="0"/>
+              <a:t>3</a:t>
+            </a:fld>
+            <a:endParaRPr lang="en"/>
+          </a:p>
+        </p:txBody>
+      </p:sp>
+    </p:spTree>
+  </p:cSld>
+  <p:clrMapOvr>
+    <a:masterClrMapping/>
+  </p:clrMapOvr>
+</p:sld>
+</file>
+
+<file path=ppt/slides/slide30.xml><?xml version="1.0" encoding="utf-8"?>
 <p:sld xmlns:a="http://schemas.openxmlformats.org/drawingml/2006/main" xmlns:r="http://schemas.openxmlformats.org/officeDocument/2006/relationships" xmlns:p="http://schemas.openxmlformats.org/presentationml/2006/main">
   <p:cSld>
     <p:spTree>
@@ -46301,7 +47742,7 @@
             </a:pPr>
             <a:fld id="{00000000-1234-1234-1234-123412341234}" type="slidenum">
               <a:rPr lang="en" smtClean="0"/>
-              <a:t>22</a:t>
+              <a:t>30</a:t>
             </a:fld>
             <a:endParaRPr lang="en"/>
           </a:p>
@@ -46315,7 +47756,7 @@
 </p:sld>
 </file>
 
-<file path=ppt/slides/slide23.xml><?xml version="1.0" encoding="utf-8"?>
+<file path=ppt/slides/slide31.xml><?xml version="1.0" encoding="utf-8"?>
 <p:sld xmlns:a="http://schemas.openxmlformats.org/drawingml/2006/main" xmlns:r="http://schemas.openxmlformats.org/officeDocument/2006/relationships" xmlns:p="http://schemas.openxmlformats.org/presentationml/2006/main">
   <p:cSld>
     <p:spTree>
@@ -46427,116 +47868,7 @@
             </a:pPr>
             <a:fld id="{00000000-1234-1234-1234-123412341234}" type="slidenum">
               <a:rPr lang="en" smtClean="0"/>
-              <a:t>23</a:t>
-            </a:fld>
-            <a:endParaRPr lang="en"/>
-          </a:p>
-        </p:txBody>
-      </p:sp>
-    </p:spTree>
-  </p:cSld>
-  <p:clrMapOvr>
-    <a:masterClrMapping/>
-  </p:clrMapOvr>
-</p:sld>
-</file>
-
-<file path=ppt/slides/slide3.xml><?xml version="1.0" encoding="utf-8"?>
-<p:sld xmlns:a="http://schemas.openxmlformats.org/drawingml/2006/main" xmlns:r="http://schemas.openxmlformats.org/officeDocument/2006/relationships" xmlns:p="http://schemas.openxmlformats.org/presentationml/2006/main">
-  <p:cSld>
-    <p:spTree>
-      <p:nvGrpSpPr>
-        <p:cNvPr id="1" name="Shape 65"/>
-        <p:cNvGrpSpPr/>
-        <p:nvPr/>
-      </p:nvGrpSpPr>
-      <p:grpSpPr>
-        <a:xfrm>
-          <a:off x="0" y="0"/>
-          <a:ext cx="0" cy="0"/>
-          <a:chOff x="0" y="0"/>
-          <a:chExt cx="0" cy="0"/>
-        </a:xfrm>
-      </p:grpSpPr>
-      <p:sp>
-        <p:nvSpPr>
-          <p:cNvPr id="66" name="Google Shape;66;p15"/>
-          <p:cNvSpPr txBox="1">
-            <a:spLocks noGrp="1"/>
-          </p:cNvSpPr>
-          <p:nvPr>
-            <p:ph type="title"/>
-          </p:nvPr>
-        </p:nvSpPr>
-        <p:spPr>
-          <a:prstGeom prst="rect">
-            <a:avLst/>
-          </a:prstGeom>
-        </p:spPr>
-        <p:txBody>
-          <a:bodyPr spcFirstLastPara="1" wrap="square" lIns="91425" tIns="91425" rIns="91425" bIns="91425" anchor="t" anchorCtr="0">
-            <a:normAutofit fontScale="90000"/>
-          </a:bodyPr>
-          <a:lstStyle/>
-          <a:p>
-            <a:pPr marL="0" lvl="0" indent="0" algn="l" rtl="0">
-              <a:spcBef>
-                <a:spcPts val="0"/>
-              </a:spcBef>
-              <a:spcAft>
-                <a:spcPts val="0"/>
-              </a:spcAft>
-              <a:buNone/>
-            </a:pPr>
-            <a:r>
-              <a:rPr lang="pt-PT" dirty="0" err="1"/>
-              <a:t>Task</a:t>
-            </a:r>
-            <a:r>
-              <a:rPr lang="pt-PT" dirty="0"/>
-              <a:t> [1.1] - </a:t>
-            </a:r>
-            <a:r>
-              <a:rPr lang="en-US" dirty="0"/>
-              <a:t>Data preparation and validation pipeline</a:t>
-            </a:r>
-            <a:endParaRPr lang="pt-PT" dirty="0"/>
-          </a:p>
-        </p:txBody>
-      </p:sp>
-      <p:sp>
-        <p:nvSpPr>
-          <p:cNvPr id="2" name="Slide Number Placeholder 1">
-            <a:extLst>
-              <a:ext uri="{FF2B5EF4-FFF2-40B4-BE49-F238E27FC236}">
-                <a16:creationId xmlns:a16="http://schemas.microsoft.com/office/drawing/2014/main" id="{2F02ADCD-40A6-0FDE-3F7E-7E3EFE9B8615}"/>
-              </a:ext>
-            </a:extLst>
-          </p:cNvPr>
-          <p:cNvSpPr>
-            <a:spLocks noGrp="1"/>
-          </p:cNvSpPr>
-          <p:nvPr>
-            <p:ph type="sldNum" idx="12"/>
-          </p:nvPr>
-        </p:nvSpPr>
-        <p:spPr/>
-        <p:txBody>
-          <a:bodyPr/>
-          <a:lstStyle/>
-          <a:p>
-            <a:pPr marL="0" lvl="0" indent="0" algn="r" rtl="0">
-              <a:spcBef>
-                <a:spcPts val="0"/>
-              </a:spcBef>
-              <a:spcAft>
-                <a:spcPts val="0"/>
-              </a:spcAft>
-              <a:buNone/>
-            </a:pPr>
-            <a:fld id="{00000000-1234-1234-1234-123412341234}" type="slidenum">
-              <a:rPr lang="en" smtClean="0"/>
-              <a:t>3</a:t>
+              <a:t>31</a:t>
             </a:fld>
             <a:endParaRPr lang="en"/>
           </a:p>
@@ -46873,6 +48205,166 @@
   <p:cSld>
     <p:spTree>
       <p:nvGrpSpPr>
+        <p:cNvPr id="1" name="">
+          <a:extLst>
+            <a:ext uri="{FF2B5EF4-FFF2-40B4-BE49-F238E27FC236}">
+              <a16:creationId xmlns:a16="http://schemas.microsoft.com/office/drawing/2014/main" id="{D3746085-88AC-EABE-5CDC-69B96B691E6A}"/>
+            </a:ext>
+          </a:extLst>
+        </p:cNvPr>
+        <p:cNvGrpSpPr/>
+        <p:nvPr/>
+      </p:nvGrpSpPr>
+      <p:grpSpPr>
+        <a:xfrm>
+          <a:off x="0" y="0"/>
+          <a:ext cx="0" cy="0"/>
+          <a:chOff x="0" y="0"/>
+          <a:chExt cx="0" cy="0"/>
+        </a:xfrm>
+      </p:grpSpPr>
+      <p:sp>
+        <p:nvSpPr>
+          <p:cNvPr id="2" name="Título 1">
+            <a:extLst>
+              <a:ext uri="{FF2B5EF4-FFF2-40B4-BE49-F238E27FC236}">
+                <a16:creationId xmlns:a16="http://schemas.microsoft.com/office/drawing/2014/main" id="{EA311B9C-2AB9-ABAA-675D-FC156CCAEF3A}"/>
+              </a:ext>
+            </a:extLst>
+          </p:cNvPr>
+          <p:cNvSpPr>
+            <a:spLocks noGrp="1"/>
+          </p:cNvSpPr>
+          <p:nvPr>
+            <p:ph type="title"/>
+          </p:nvPr>
+        </p:nvSpPr>
+        <p:spPr/>
+        <p:txBody>
+          <a:bodyPr>
+            <a:normAutofit fontScale="90000"/>
+          </a:bodyPr>
+          <a:lstStyle/>
+          <a:p>
+            <a:r>
+              <a:rPr lang="en-US" dirty="0"/>
+              <a:t>Results and Analysis from task [1.1]</a:t>
+            </a:r>
+            <a:endParaRPr lang="pt-PT" dirty="0"/>
+          </a:p>
+        </p:txBody>
+      </p:sp>
+      <p:sp>
+        <p:nvSpPr>
+          <p:cNvPr id="3" name="Marcador de Posição do Texto 2">
+            <a:extLst>
+              <a:ext uri="{FF2B5EF4-FFF2-40B4-BE49-F238E27FC236}">
+                <a16:creationId xmlns:a16="http://schemas.microsoft.com/office/drawing/2014/main" id="{87461F57-3821-549D-1BB2-1D72395B058D}"/>
+              </a:ext>
+            </a:extLst>
+          </p:cNvPr>
+          <p:cNvSpPr>
+            <a:spLocks noGrp="1"/>
+          </p:cNvSpPr>
+          <p:nvPr>
+            <p:ph type="body" idx="1"/>
+          </p:nvPr>
+        </p:nvSpPr>
+        <p:spPr/>
+        <p:txBody>
+          <a:bodyPr/>
+          <a:lstStyle/>
+          <a:p>
+            <a:endParaRPr lang="pt-PT" dirty="0"/>
+          </a:p>
+        </p:txBody>
+      </p:sp>
+      <p:sp>
+        <p:nvSpPr>
+          <p:cNvPr id="4" name="Slide Number Placeholder 3">
+            <a:extLst>
+              <a:ext uri="{FF2B5EF4-FFF2-40B4-BE49-F238E27FC236}">
+                <a16:creationId xmlns:a16="http://schemas.microsoft.com/office/drawing/2014/main" id="{2BC66AB1-AA82-0A70-D519-B5475214E741}"/>
+              </a:ext>
+            </a:extLst>
+          </p:cNvPr>
+          <p:cNvSpPr>
+            <a:spLocks noGrp="1"/>
+          </p:cNvSpPr>
+          <p:nvPr>
+            <p:ph type="sldNum" idx="12"/>
+          </p:nvPr>
+        </p:nvSpPr>
+        <p:spPr/>
+        <p:txBody>
+          <a:bodyPr/>
+          <a:lstStyle/>
+          <a:p>
+            <a:pPr marL="0" lvl="0" indent="0" algn="r" rtl="0">
+              <a:spcBef>
+                <a:spcPts val="0"/>
+              </a:spcBef>
+              <a:spcAft>
+                <a:spcPts val="0"/>
+              </a:spcAft>
+              <a:buNone/>
+            </a:pPr>
+            <a:fld id="{00000000-1234-1234-1234-123412341234}" type="slidenum">
+              <a:rPr lang="en" smtClean="0"/>
+              <a:t>6</a:t>
+            </a:fld>
+            <a:endParaRPr lang="en"/>
+          </a:p>
+        </p:txBody>
+      </p:sp>
+      <p:pic>
+        <p:nvPicPr>
+          <p:cNvPr id="6" name="Imagem 5" descr="Uma imagem com texto, captura de ecrã, Tipo de letra, file&#10;&#10;Os conteúdos gerados por IA podem estar incorretos.">
+            <a:extLst>
+              <a:ext uri="{FF2B5EF4-FFF2-40B4-BE49-F238E27FC236}">
+                <a16:creationId xmlns:a16="http://schemas.microsoft.com/office/drawing/2014/main" id="{40E35B5E-5C32-3E89-092B-A68FB52B395C}"/>
+              </a:ext>
+            </a:extLst>
+          </p:cNvPr>
+          <p:cNvPicPr>
+            <a:picLocks noChangeAspect="1"/>
+          </p:cNvPicPr>
+          <p:nvPr/>
+        </p:nvPicPr>
+        <p:blipFill>
+          <a:blip r:embed="rId2"/>
+          <a:stretch>
+            <a:fillRect/>
+          </a:stretch>
+        </p:blipFill>
+        <p:spPr>
+          <a:xfrm>
+            <a:off x="311700" y="1564105"/>
+            <a:ext cx="4626621" cy="2761324"/>
+          </a:xfrm>
+          <a:prstGeom prst="rect">
+            <a:avLst/>
+          </a:prstGeom>
+        </p:spPr>
+      </p:pic>
+    </p:spTree>
+    <p:extLst>
+      <p:ext uri="{BB962C8B-B14F-4D97-AF65-F5344CB8AC3E}">
+        <p14:creationId xmlns:p14="http://schemas.microsoft.com/office/powerpoint/2010/main" val="2926091966"/>
+      </p:ext>
+    </p:extLst>
+  </p:cSld>
+  <p:clrMapOvr>
+    <a:masterClrMapping/>
+  </p:clrMapOvr>
+</p:sld>
+</file>
+
+<file path=ppt/slides/slide7.xml><?xml version="1.0" encoding="utf-8"?>
+<p:sld xmlns:a="http://schemas.openxmlformats.org/drawingml/2006/main" xmlns:r="http://schemas.openxmlformats.org/officeDocument/2006/relationships" xmlns:p="http://schemas.openxmlformats.org/presentationml/2006/main">
+  <p:cSld>
+    <p:spTree>
+      <p:nvGrpSpPr>
         <p:cNvPr id="1" name=""/>
         <p:cNvGrpSpPr/>
         <p:nvPr/>
@@ -46973,12 +48465,42 @@
             </a:pPr>
             <a:fld id="{00000000-1234-1234-1234-123412341234}" type="slidenum">
               <a:rPr lang="en" smtClean="0"/>
-              <a:t>6</a:t>
+              <a:t>7</a:t>
             </a:fld>
             <a:endParaRPr lang="en"/>
           </a:p>
         </p:txBody>
       </p:sp>
+      <p:pic>
+        <p:nvPicPr>
+          <p:cNvPr id="6" name="Imagem 5" descr="Uma imagem com texto, captura de ecrã, diagrama, número&#10;&#10;Os conteúdos gerados por IA podem estar incorretos.">
+            <a:extLst>
+              <a:ext uri="{FF2B5EF4-FFF2-40B4-BE49-F238E27FC236}">
+                <a16:creationId xmlns:a16="http://schemas.microsoft.com/office/drawing/2014/main" id="{11DDDB60-A0D3-BBAD-41BD-983921AA7EA5}"/>
+              </a:ext>
+            </a:extLst>
+          </p:cNvPr>
+          <p:cNvPicPr>
+            <a:picLocks noChangeAspect="1"/>
+          </p:cNvPicPr>
+          <p:nvPr/>
+        </p:nvPicPr>
+        <p:blipFill>
+          <a:blip r:embed="rId2"/>
+          <a:stretch>
+            <a:fillRect/>
+          </a:stretch>
+        </p:blipFill>
+        <p:spPr>
+          <a:xfrm>
+            <a:off x="311700" y="1152475"/>
+            <a:ext cx="5499476" cy="3416400"/>
+          </a:xfrm>
+          <a:prstGeom prst="rect">
+            <a:avLst/>
+          </a:prstGeom>
+        </p:spPr>
+      </p:pic>
     </p:spTree>
     <p:extLst>
       <p:ext uri="{BB962C8B-B14F-4D97-AF65-F5344CB8AC3E}">
@@ -46992,12 +48514,18 @@
 </p:sld>
 </file>
 
-<file path=ppt/slides/slide7.xml><?xml version="1.0" encoding="utf-8"?>
+<file path=ppt/slides/slide8.xml><?xml version="1.0" encoding="utf-8"?>
 <p:sld xmlns:a="http://schemas.openxmlformats.org/drawingml/2006/main" xmlns:r="http://schemas.openxmlformats.org/officeDocument/2006/relationships" xmlns:p="http://schemas.openxmlformats.org/presentationml/2006/main">
   <p:cSld>
     <p:spTree>
       <p:nvGrpSpPr>
-        <p:cNvPr id="1" name="Shape 65"/>
+        <p:cNvPr id="1" name="">
+          <a:extLst>
+            <a:ext uri="{FF2B5EF4-FFF2-40B4-BE49-F238E27FC236}">
+              <a16:creationId xmlns:a16="http://schemas.microsoft.com/office/drawing/2014/main" id="{20DF7034-EDE2-860F-CB64-1BB55530BC85}"/>
+            </a:ext>
+          </a:extLst>
+        </p:cNvPr>
         <p:cNvGrpSpPr/>
         <p:nvPr/>
       </p:nvGrpSpPr>
@@ -47011,69 +48539,30 @@
       </p:grpSpPr>
       <p:sp>
         <p:nvSpPr>
-          <p:cNvPr id="66" name="Google Shape;66;p15"/>
-          <p:cNvSpPr txBox="1">
+          <p:cNvPr id="2" name="Título 1">
+            <a:extLst>
+              <a:ext uri="{FF2B5EF4-FFF2-40B4-BE49-F238E27FC236}">
+                <a16:creationId xmlns:a16="http://schemas.microsoft.com/office/drawing/2014/main" id="{2A5A70EF-DDC4-C226-C2C4-BB16DD9E25CD}"/>
+              </a:ext>
+            </a:extLst>
+          </p:cNvPr>
+          <p:cNvSpPr>
             <a:spLocks noGrp="1"/>
           </p:cNvSpPr>
           <p:nvPr>
             <p:ph type="title"/>
           </p:nvPr>
         </p:nvSpPr>
-        <p:spPr>
-          <a:prstGeom prst="rect">
-            <a:avLst/>
-          </a:prstGeom>
-        </p:spPr>
+        <p:spPr/>
         <p:txBody>
-          <a:bodyPr spcFirstLastPara="1" wrap="square" lIns="91425" tIns="91425" rIns="91425" bIns="91425" anchor="t" anchorCtr="0">
-            <a:normAutofit/>
+          <a:bodyPr>
+            <a:normAutofit fontScale="90000"/>
           </a:bodyPr>
           <a:lstStyle/>
           <a:p>
-            <a:pPr marL="0" lvl="0" indent="0" algn="l" rtl="0">
-              <a:spcBef>
-                <a:spcPts val="0"/>
-              </a:spcBef>
-              <a:spcAft>
-                <a:spcPts val="0"/>
-              </a:spcAft>
-              <a:buNone/>
-            </a:pPr>
             <a:r>
-              <a:rPr lang="pt-PT" dirty="0" err="1"/>
-              <a:t>Task</a:t>
-            </a:r>
-            <a:r>
-              <a:rPr lang="pt-PT" dirty="0"/>
-              <a:t> [1.2] - </a:t>
-            </a:r>
-            <a:r>
-              <a:rPr lang="pt-PT" dirty="0" err="1"/>
-              <a:t>Learn</a:t>
-            </a:r>
-            <a:r>
-              <a:rPr lang="pt-PT" dirty="0"/>
-              <a:t> </a:t>
-            </a:r>
-            <a:r>
-              <a:rPr lang="pt-PT" dirty="0" err="1"/>
-              <a:t>the</a:t>
-            </a:r>
-            <a:r>
-              <a:rPr lang="pt-PT" dirty="0"/>
-              <a:t> </a:t>
-            </a:r>
-            <a:r>
-              <a:rPr lang="pt-PT" dirty="0" err="1"/>
-              <a:t>baseline</a:t>
-            </a:r>
-            <a:r>
-              <a:rPr lang="pt-PT" dirty="0"/>
-              <a:t> </a:t>
-            </a:r>
-            <a:r>
-              <a:rPr lang="pt-PT" dirty="0" err="1"/>
-              <a:t>model</a:t>
+              <a:rPr lang="en-US" dirty="0"/>
+              <a:t>Results and Analysis from task [1.1]</a:t>
             </a:r>
             <a:endParaRPr lang="pt-PT" dirty="0"/>
           </a:p>
@@ -47081,10 +48570,35 @@
       </p:sp>
       <p:sp>
         <p:nvSpPr>
-          <p:cNvPr id="2" name="Slide Number Placeholder 1">
+          <p:cNvPr id="3" name="Marcador de Posição do Texto 2">
             <a:extLst>
               <a:ext uri="{FF2B5EF4-FFF2-40B4-BE49-F238E27FC236}">
-                <a16:creationId xmlns:a16="http://schemas.microsoft.com/office/drawing/2014/main" id="{2F02ADCD-40A6-0FDE-3F7E-7E3EFE9B8615}"/>
+                <a16:creationId xmlns:a16="http://schemas.microsoft.com/office/drawing/2014/main" id="{653F793E-1C71-EC3A-953C-B5E1CB5A85A2}"/>
+              </a:ext>
+            </a:extLst>
+          </p:cNvPr>
+          <p:cNvSpPr>
+            <a:spLocks noGrp="1"/>
+          </p:cNvSpPr>
+          <p:nvPr>
+            <p:ph type="body" idx="1"/>
+          </p:nvPr>
+        </p:nvSpPr>
+        <p:spPr/>
+        <p:txBody>
+          <a:bodyPr/>
+          <a:lstStyle/>
+          <a:p>
+            <a:endParaRPr lang="pt-PT" dirty="0"/>
+          </a:p>
+        </p:txBody>
+      </p:sp>
+      <p:sp>
+        <p:nvSpPr>
+          <p:cNvPr id="4" name="Slide Number Placeholder 3">
+            <a:extLst>
+              <a:ext uri="{FF2B5EF4-FFF2-40B4-BE49-F238E27FC236}">
+                <a16:creationId xmlns:a16="http://schemas.microsoft.com/office/drawing/2014/main" id="{923875D1-4B3C-0E9A-394A-6BCE4F04AF5C}"/>
               </a:ext>
             </a:extLst>
           </p:cNvPr>
@@ -47111,16 +48625,46 @@
             </a:pPr>
             <a:fld id="{00000000-1234-1234-1234-123412341234}" type="slidenum">
               <a:rPr lang="en" smtClean="0"/>
-              <a:t>7</a:t>
+              <a:t>8</a:t>
             </a:fld>
             <a:endParaRPr lang="en"/>
           </a:p>
         </p:txBody>
       </p:sp>
+      <p:pic>
+        <p:nvPicPr>
+          <p:cNvPr id="6" name="Imagem 5" descr="Uma imagem com texto, captura de ecrã, file, Retângulo&#10;&#10;Os conteúdos gerados por IA podem estar incorretos.">
+            <a:extLst>
+              <a:ext uri="{FF2B5EF4-FFF2-40B4-BE49-F238E27FC236}">
+                <a16:creationId xmlns:a16="http://schemas.microsoft.com/office/drawing/2014/main" id="{A547CE73-1A1E-3358-CA04-06D6593E022C}"/>
+              </a:ext>
+            </a:extLst>
+          </p:cNvPr>
+          <p:cNvPicPr>
+            <a:picLocks noChangeAspect="1"/>
+          </p:cNvPicPr>
+          <p:nvPr/>
+        </p:nvPicPr>
+        <p:blipFill>
+          <a:blip r:embed="rId2"/>
+          <a:stretch>
+            <a:fillRect/>
+          </a:stretch>
+        </p:blipFill>
+        <p:spPr>
+          <a:xfrm>
+            <a:off x="311700" y="1325744"/>
+            <a:ext cx="5142497" cy="3069862"/>
+          </a:xfrm>
+          <a:prstGeom prst="rect">
+            <a:avLst/>
+          </a:prstGeom>
+        </p:spPr>
+      </p:pic>
     </p:spTree>
     <p:extLst>
       <p:ext uri="{BB962C8B-B14F-4D97-AF65-F5344CB8AC3E}">
-        <p14:creationId xmlns:p14="http://schemas.microsoft.com/office/powerpoint/2010/main" val="774767926"/>
+        <p14:creationId xmlns:p14="http://schemas.microsoft.com/office/powerpoint/2010/main" val="4176173872"/>
       </p:ext>
     </p:extLst>
   </p:cSld>
@@ -47130,12 +48674,18 @@
 </p:sld>
 </file>
 
-<file path=ppt/slides/slide8.xml><?xml version="1.0" encoding="utf-8"?>
+<file path=ppt/slides/slide9.xml><?xml version="1.0" encoding="utf-8"?>
 <p:sld xmlns:a="http://schemas.openxmlformats.org/drawingml/2006/main" xmlns:r="http://schemas.openxmlformats.org/officeDocument/2006/relationships" xmlns:p="http://schemas.openxmlformats.org/presentationml/2006/main">
   <p:cSld>
     <p:spTree>
       <p:nvGrpSpPr>
-        <p:cNvPr id="1" name=""/>
+        <p:cNvPr id="1" name="">
+          <a:extLst>
+            <a:ext uri="{FF2B5EF4-FFF2-40B4-BE49-F238E27FC236}">
+              <a16:creationId xmlns:a16="http://schemas.microsoft.com/office/drawing/2014/main" id="{C4A0AA20-8C1D-C96F-D7E9-501BFFF3D910}"/>
+            </a:ext>
+          </a:extLst>
+        </p:cNvPr>
         <p:cNvGrpSpPr/>
         <p:nvPr/>
       </p:nvGrpSpPr>
@@ -47152,7 +48702,7 @@
           <p:cNvPr id="2" name="Título 1">
             <a:extLst>
               <a:ext uri="{FF2B5EF4-FFF2-40B4-BE49-F238E27FC236}">
-                <a16:creationId xmlns:a16="http://schemas.microsoft.com/office/drawing/2014/main" id="{435950B8-3572-2171-184D-7CB447F81866}"/>
+                <a16:creationId xmlns:a16="http://schemas.microsoft.com/office/drawing/2014/main" id="{2B72F8BA-91A2-06FB-8D65-E61523CC1BF8}"/>
               </a:ext>
             </a:extLst>
           </p:cNvPr>
@@ -47163,28 +48713,43 @@
             <p:ph type="title"/>
           </p:nvPr>
         </p:nvSpPr>
-        <p:spPr>
-          <a:xfrm>
-            <a:off x="311700" y="445025"/>
-            <a:ext cx="8520600" cy="572700"/>
-          </a:xfrm>
-        </p:spPr>
+        <p:spPr/>
         <p:txBody>
-          <a:bodyPr wrap="square" anchor="ctr">
-            <a:normAutofit/>
+          <a:bodyPr>
+            <a:normAutofit fontScale="90000"/>
           </a:bodyPr>
           <a:lstStyle/>
           <a:p>
-            <a:pPr>
-              <a:lnSpc>
-                <a:spcPct val="90000"/>
-              </a:lnSpc>
-            </a:pPr>
             <a:r>
-              <a:rPr lang="en-US" sz="2600"/>
-              <a:t>What was done in task [1.2]</a:t>
+              <a:rPr lang="en-US" dirty="0"/>
+              <a:t>Results and Analysis from task [1.1]</a:t>
             </a:r>
-            <a:endParaRPr lang="pt-PT" sz="2600"/>
+            <a:endParaRPr lang="pt-PT" dirty="0"/>
+          </a:p>
+        </p:txBody>
+      </p:sp>
+      <p:sp>
+        <p:nvSpPr>
+          <p:cNvPr id="3" name="Marcador de Posição do Texto 2">
+            <a:extLst>
+              <a:ext uri="{FF2B5EF4-FFF2-40B4-BE49-F238E27FC236}">
+                <a16:creationId xmlns:a16="http://schemas.microsoft.com/office/drawing/2014/main" id="{707A05FE-F07E-44F8-A0FA-930DED93DD2E}"/>
+              </a:ext>
+            </a:extLst>
+          </p:cNvPr>
+          <p:cNvSpPr>
+            <a:spLocks noGrp="1"/>
+          </p:cNvSpPr>
+          <p:nvPr>
+            <p:ph type="body" idx="1"/>
+          </p:nvPr>
+        </p:nvSpPr>
+        <p:spPr/>
+        <p:txBody>
+          <a:bodyPr/>
+          <a:lstStyle/>
+          <a:p>
+            <a:endParaRPr lang="pt-PT" dirty="0"/>
           </a:p>
         </p:txBody>
       </p:sp>
@@ -47193,7 +48758,7 @@
           <p:cNvPr id="4" name="Slide Number Placeholder 3">
             <a:extLst>
               <a:ext uri="{FF2B5EF4-FFF2-40B4-BE49-F238E27FC236}">
-                <a16:creationId xmlns:a16="http://schemas.microsoft.com/office/drawing/2014/main" id="{EF6583C8-87CC-4DDC-5CE6-18034C27EBE7}"/>
+                <a16:creationId xmlns:a16="http://schemas.microsoft.com/office/drawing/2014/main" id="{8DDD8356-95FB-F47A-D53F-41057F612372}"/>
               </a:ext>
             </a:extLst>
           </p:cNvPr>
@@ -47204,241 +48769,62 @@
             <p:ph type="sldNum" idx="12"/>
           </p:nvPr>
         </p:nvSpPr>
-        <p:spPr>
-          <a:xfrm>
-            <a:off x="8472458" y="4663217"/>
-            <a:ext cx="548700" cy="393600"/>
-          </a:xfrm>
-        </p:spPr>
+        <p:spPr/>
         <p:txBody>
-          <a:bodyPr wrap="square" anchor="ctr">
-            <a:normAutofit/>
-          </a:bodyPr>
+          <a:bodyPr/>
           <a:lstStyle/>
           <a:p>
-            <a:pPr marL="0" lvl="0" indent="0" rtl="0">
-              <a:lnSpc>
-                <a:spcPct val="90000"/>
-              </a:lnSpc>
+            <a:pPr marL="0" lvl="0" indent="0" algn="r" rtl="0">
               <a:spcBef>
                 <a:spcPts val="0"/>
               </a:spcBef>
               <a:spcAft>
-                <a:spcPts val="600"/>
+                <a:spcPts val="0"/>
               </a:spcAft>
               <a:buNone/>
             </a:pPr>
             <a:fld id="{00000000-1234-1234-1234-123412341234}" type="slidenum">
-              <a:rPr lang="en" sz="900" smtClean="0"/>
-              <a:pPr marL="0" lvl="0" indent="0" rtl="0">
-                <a:lnSpc>
-                  <a:spcPct val="90000"/>
-                </a:lnSpc>
-                <a:spcBef>
-                  <a:spcPts val="0"/>
-                </a:spcBef>
-                <a:spcAft>
-                  <a:spcPts val="600"/>
-                </a:spcAft>
-                <a:buNone/>
-              </a:pPr>
-              <a:t>8</a:t>
+              <a:rPr lang="en" smtClean="0"/>
+              <a:t>9</a:t>
             </a:fld>
-            <a:endParaRPr lang="en" sz="900"/>
+            <a:endParaRPr lang="en"/>
           </a:p>
         </p:txBody>
       </p:sp>
-      <p:graphicFrame>
-        <p:nvGraphicFramePr>
-          <p:cNvPr id="9" name="Marcador de Posição do Texto 6">
+      <p:pic>
+        <p:nvPicPr>
+          <p:cNvPr id="6" name="Imagem 5" descr="Uma imagem com texto, diagrama, file, Desenho técnico&#10;&#10;Os conteúdos gerados por IA podem estar incorretos.">
             <a:extLst>
               <a:ext uri="{FF2B5EF4-FFF2-40B4-BE49-F238E27FC236}">
-                <a16:creationId xmlns:a16="http://schemas.microsoft.com/office/drawing/2014/main" id="{CC3716AE-7CAA-1B30-9DEA-AA12FA1F18F6}"/>
+                <a16:creationId xmlns:a16="http://schemas.microsoft.com/office/drawing/2014/main" id="{6251582D-1F5D-547E-C3AB-234266A37E2A}"/>
               </a:ext>
             </a:extLst>
           </p:cNvPr>
-          <p:cNvGraphicFramePr/>
-          <p:nvPr>
-            <p:extLst>
-              <p:ext uri="{D42A27DB-BD31-4B8C-83A1-F6EECF244321}">
-                <p14:modId xmlns:p14="http://schemas.microsoft.com/office/powerpoint/2010/main" val="3233458579"/>
-              </p:ext>
-            </p:extLst>
-          </p:nvPr>
-        </p:nvGraphicFramePr>
-        <p:xfrm>
-          <a:off x="311700" y="1208225"/>
-          <a:ext cx="8520600" cy="3264408"/>
-        </p:xfrm>
-        <a:graphic>
-          <a:graphicData uri="http://schemas.openxmlformats.org/drawingml/2006/diagram">
-            <dgm:relIds xmlns:dgm="http://schemas.openxmlformats.org/drawingml/2006/diagram" xmlns:r="http://schemas.openxmlformats.org/officeDocument/2006/relationships" r:dm="rId2" r:lo="rId3" r:qs="rId4" r:cs="rId5"/>
-          </a:graphicData>
-        </a:graphic>
-      </p:graphicFrame>
+          <p:cNvPicPr>
+            <a:picLocks noChangeAspect="1"/>
+          </p:cNvPicPr>
+          <p:nvPr/>
+        </p:nvPicPr>
+        <p:blipFill>
+          <a:blip r:embed="rId2"/>
+          <a:stretch>
+            <a:fillRect/>
+          </a:stretch>
+        </p:blipFill>
+        <p:spPr>
+          <a:xfrm>
+            <a:off x="311700" y="1282074"/>
+            <a:ext cx="5876287" cy="3416401"/>
+          </a:xfrm>
+          <a:prstGeom prst="rect">
+            <a:avLst/>
+          </a:prstGeom>
+        </p:spPr>
+      </p:pic>
     </p:spTree>
     <p:extLst>
       <p:ext uri="{BB962C8B-B14F-4D97-AF65-F5344CB8AC3E}">
-        <p14:creationId xmlns:p14="http://schemas.microsoft.com/office/powerpoint/2010/main" val="2225735654"/>
-      </p:ext>
-    </p:extLst>
-  </p:cSld>
-  <p:clrMapOvr>
-    <a:masterClrMapping/>
-  </p:clrMapOvr>
-</p:sld>
-</file>
-
-<file path=ppt/slides/slide9.xml><?xml version="1.0" encoding="utf-8"?>
-<p:sld xmlns:a="http://schemas.openxmlformats.org/drawingml/2006/main" xmlns:r="http://schemas.openxmlformats.org/officeDocument/2006/relationships" xmlns:p="http://schemas.openxmlformats.org/presentationml/2006/main">
-  <p:cSld>
-    <p:spTree>
-      <p:nvGrpSpPr>
-        <p:cNvPr id="1" name=""/>
-        <p:cNvGrpSpPr/>
-        <p:nvPr/>
-      </p:nvGrpSpPr>
-      <p:grpSpPr>
-        <a:xfrm>
-          <a:off x="0" y="0"/>
-          <a:ext cx="0" cy="0"/>
-          <a:chOff x="0" y="0"/>
-          <a:chExt cx="0" cy="0"/>
-        </a:xfrm>
-      </p:grpSpPr>
-      <p:sp>
-        <p:nvSpPr>
-          <p:cNvPr id="2" name="Título 1">
-            <a:extLst>
-              <a:ext uri="{FF2B5EF4-FFF2-40B4-BE49-F238E27FC236}">
-                <a16:creationId xmlns:a16="http://schemas.microsoft.com/office/drawing/2014/main" id="{435950B8-3572-2171-184D-7CB447F81866}"/>
-              </a:ext>
-            </a:extLst>
-          </p:cNvPr>
-          <p:cNvSpPr>
-            <a:spLocks noGrp="1"/>
-          </p:cNvSpPr>
-          <p:nvPr>
-            <p:ph type="title"/>
-          </p:nvPr>
-        </p:nvSpPr>
-        <p:spPr>
-          <a:xfrm>
-            <a:off x="311700" y="445025"/>
-            <a:ext cx="8520600" cy="572700"/>
-          </a:xfrm>
-        </p:spPr>
-        <p:txBody>
-          <a:bodyPr wrap="square" anchor="ctr">
-            <a:normAutofit/>
-          </a:bodyPr>
-          <a:lstStyle/>
-          <a:p>
-            <a:pPr>
-              <a:lnSpc>
-                <a:spcPct val="90000"/>
-              </a:lnSpc>
-            </a:pPr>
-            <a:r>
-              <a:rPr lang="en-US" sz="2600"/>
-              <a:t>What was done in task [1.2]</a:t>
-            </a:r>
-            <a:endParaRPr lang="pt-PT" sz="2600"/>
-          </a:p>
-        </p:txBody>
-      </p:sp>
-      <p:sp>
-        <p:nvSpPr>
-          <p:cNvPr id="4" name="Slide Number Placeholder 3">
-            <a:extLst>
-              <a:ext uri="{FF2B5EF4-FFF2-40B4-BE49-F238E27FC236}">
-                <a16:creationId xmlns:a16="http://schemas.microsoft.com/office/drawing/2014/main" id="{EF6583C8-87CC-4DDC-5CE6-18034C27EBE7}"/>
-              </a:ext>
-            </a:extLst>
-          </p:cNvPr>
-          <p:cNvSpPr>
-            <a:spLocks noGrp="1"/>
-          </p:cNvSpPr>
-          <p:nvPr>
-            <p:ph type="sldNum" idx="12"/>
-          </p:nvPr>
-        </p:nvSpPr>
-        <p:spPr>
-          <a:xfrm>
-            <a:off x="8472458" y="4663217"/>
-            <a:ext cx="548700" cy="393600"/>
-          </a:xfrm>
-        </p:spPr>
-        <p:txBody>
-          <a:bodyPr wrap="square" anchor="ctr">
-            <a:normAutofit/>
-          </a:bodyPr>
-          <a:lstStyle/>
-          <a:p>
-            <a:pPr marL="0" lvl="0" indent="0" rtl="0">
-              <a:lnSpc>
-                <a:spcPct val="90000"/>
-              </a:lnSpc>
-              <a:spcBef>
-                <a:spcPts val="0"/>
-              </a:spcBef>
-              <a:spcAft>
-                <a:spcPts val="600"/>
-              </a:spcAft>
-              <a:buNone/>
-            </a:pPr>
-            <a:fld id="{00000000-1234-1234-1234-123412341234}" type="slidenum">
-              <a:rPr lang="en" sz="900" smtClean="0"/>
-              <a:pPr marL="0" lvl="0" indent="0" rtl="0">
-                <a:lnSpc>
-                  <a:spcPct val="90000"/>
-                </a:lnSpc>
-                <a:spcBef>
-                  <a:spcPts val="0"/>
-                </a:spcBef>
-                <a:spcAft>
-                  <a:spcPts val="600"/>
-                </a:spcAft>
-                <a:buNone/>
-              </a:pPr>
-              <a:t>9</a:t>
-            </a:fld>
-            <a:endParaRPr lang="en" sz="900"/>
-          </a:p>
-        </p:txBody>
-      </p:sp>
-      <p:graphicFrame>
-        <p:nvGraphicFramePr>
-          <p:cNvPr id="9" name="Marcador de Posição do Texto 6">
-            <a:extLst>
-              <a:ext uri="{FF2B5EF4-FFF2-40B4-BE49-F238E27FC236}">
-                <a16:creationId xmlns:a16="http://schemas.microsoft.com/office/drawing/2014/main" id="{5B5FDDFE-C925-F69E-4B7B-77EA7771CBB3}"/>
-              </a:ext>
-            </a:extLst>
-          </p:cNvPr>
-          <p:cNvGraphicFramePr/>
-          <p:nvPr>
-            <p:extLst>
-              <p:ext uri="{D42A27DB-BD31-4B8C-83A1-F6EECF244321}">
-                <p14:modId xmlns:p14="http://schemas.microsoft.com/office/powerpoint/2010/main" val="2096224779"/>
-              </p:ext>
-            </p:extLst>
-          </p:nvPr>
-        </p:nvGraphicFramePr>
-        <p:xfrm>
-          <a:off x="311700" y="1208225"/>
-          <a:ext cx="8520600" cy="3264408"/>
-        </p:xfrm>
-        <a:graphic>
-          <a:graphicData uri="http://schemas.openxmlformats.org/drawingml/2006/diagram">
-            <dgm:relIds xmlns:dgm="http://schemas.openxmlformats.org/drawingml/2006/diagram" xmlns:r="http://schemas.openxmlformats.org/officeDocument/2006/relationships" r:dm="rId2" r:lo="rId3" r:qs="rId4" r:cs="rId5"/>
-          </a:graphicData>
-        </a:graphic>
-      </p:graphicFrame>
-    </p:spTree>
-    <p:extLst>
-      <p:ext uri="{BB962C8B-B14F-4D97-AF65-F5344CB8AC3E}">
-        <p14:creationId xmlns:p14="http://schemas.microsoft.com/office/powerpoint/2010/main" val="1017707277"/>
+        <p14:creationId xmlns:p14="http://schemas.microsoft.com/office/powerpoint/2010/main" val="4255953336"/>
       </p:ext>
     </p:extLst>
   </p:cSld>

</xml_diff>